<commit_message>
HW21: Finish reviewing Lect 6 - 9
</commit_message>
<xml_diff>
--- a/ece-18-642/lec-20-to-24/hw21/HW21_NGUYEN_Todd_noid.pptx
+++ b/ece-18-642/lec-20-to-24/hw21/HW21_NGUYEN_Todd_noid.pptx
@@ -5,7 +5,7 @@
     <p:sldMasterId id="2147483744" r:id="rId1"/>
   </p:sldMasterIdLst>
   <p:notesMasterIdLst>
-    <p:notesMasterId r:id="rId11"/>
+    <p:notesMasterId r:id="rId14"/>
   </p:notesMasterIdLst>
   <p:sldIdLst>
     <p:sldId id="258" r:id="rId2"/>
@@ -17,6 +17,9 @@
     <p:sldId id="264" r:id="rId8"/>
     <p:sldId id="265" r:id="rId9"/>
     <p:sldId id="266" r:id="rId10"/>
+    <p:sldId id="267" r:id="rId11"/>
+    <p:sldId id="268" r:id="rId12"/>
+    <p:sldId id="269" r:id="rId13"/>
   </p:sldIdLst>
   <p:sldSz cx="12192000" cy="6858000"/>
   <p:notesSz cx="6858000" cy="9144000"/>
@@ -208,7 +211,7 @@
           <a:p>
             <a:fld id="{065D50C4-F9DE-4579-A940-E890F130168A}" type="datetimeFigureOut">
               <a:rPr lang="en-US" smtClean="0"/>
-              <a:t>2021-04-10</a:t>
+              <a:t>2021-04-11</a:t>
             </a:fld>
             <a:endParaRPr lang="en-US"/>
           </a:p>
@@ -607,7 +610,7 @@
           <a:p>
             <a:fld id="{E8557CB6-4DF2-454E-ABC9-30A60A3AEB68}" type="datetime1">
               <a:rPr lang="en-US" smtClean="0"/>
-              <a:t>2021-04-10</a:t>
+              <a:t>2021-04-11</a:t>
             </a:fld>
             <a:endParaRPr lang="en-US"/>
           </a:p>
@@ -786,7 +789,7 @@
           <a:p>
             <a:fld id="{34BF70C2-1023-44A4-98A6-B757A90D4AF8}" type="datetime1">
               <a:rPr lang="en-US" smtClean="0"/>
-              <a:t>2021-04-10</a:t>
+              <a:t>2021-04-11</a:t>
             </a:fld>
             <a:endParaRPr lang="en-US"/>
           </a:p>
@@ -970,7 +973,7 @@
           <a:p>
             <a:fld id="{1634F150-8679-4517-AF8C-D19735337D02}" type="datetime1">
               <a:rPr lang="en-US" smtClean="0"/>
-              <a:t>2021-04-10</a:t>
+              <a:t>2021-04-11</a:t>
             </a:fld>
             <a:endParaRPr lang="en-US"/>
           </a:p>
@@ -1144,7 +1147,7 @@
           <a:p>
             <a:fld id="{3BC0CF1B-8655-4AED-9A9E-306C7276293F}" type="datetime1">
               <a:rPr lang="en-US" smtClean="0"/>
-              <a:t>2021-04-10</a:t>
+              <a:t>2021-04-11</a:t>
             </a:fld>
             <a:endParaRPr lang="en-US"/>
           </a:p>
@@ -1399,7 +1402,7 @@
           <a:p>
             <a:fld id="{C9216115-32C9-4638-A572-3EE4E4F1B302}" type="datetime1">
               <a:rPr lang="en-US" smtClean="0"/>
-              <a:t>2021-04-10</a:t>
+              <a:t>2021-04-11</a:t>
             </a:fld>
             <a:endParaRPr lang="en-US"/>
           </a:p>
@@ -1640,7 +1643,7 @@
           <a:p>
             <a:fld id="{E83806C0-E6F2-424E-9E17-3394F2CAC167}" type="datetime1">
               <a:rPr lang="en-US" smtClean="0"/>
-              <a:t>2021-04-10</a:t>
+              <a:t>2021-04-11</a:t>
             </a:fld>
             <a:endParaRPr lang="en-US"/>
           </a:p>
@@ -2011,7 +2014,7 @@
           <a:p>
             <a:fld id="{E8C90ED4-DFAE-422E-B2A9-D466B675187E}" type="datetime1">
               <a:rPr lang="en-US" smtClean="0"/>
-              <a:t>2021-04-10</a:t>
+              <a:t>2021-04-11</a:t>
             </a:fld>
             <a:endParaRPr lang="en-US"/>
           </a:p>
@@ -2133,7 +2136,7 @@
           <a:p>
             <a:fld id="{E54899AC-4EA5-42F4-809E-7553FBFDD84D}" type="datetime1">
               <a:rPr lang="en-US" smtClean="0"/>
-              <a:t>2021-04-10</a:t>
+              <a:t>2021-04-11</a:t>
             </a:fld>
             <a:endParaRPr lang="en-US"/>
           </a:p>
@@ -2232,7 +2235,7 @@
           <a:p>
             <a:fld id="{571A050E-B635-4DAD-B4DD-5746EBF6F110}" type="datetime1">
               <a:rPr lang="en-US" smtClean="0"/>
-              <a:t>2021-04-10</a:t>
+              <a:t>2021-04-11</a:t>
             </a:fld>
             <a:endParaRPr lang="en-US"/>
           </a:p>
@@ -2513,7 +2516,7 @@
           <a:p>
             <a:fld id="{D16AE2A2-3C8D-460E-B818-CD0BD729B839}" type="datetime1">
               <a:rPr lang="en-US" smtClean="0"/>
-              <a:t>2021-04-10</a:t>
+              <a:t>2021-04-11</a:t>
             </a:fld>
             <a:endParaRPr lang="en-US"/>
           </a:p>
@@ -2774,7 +2777,7 @@
           <a:p>
             <a:fld id="{1E62E75C-07AE-40D4-9DF6-12B41D67C972}" type="datetime1">
               <a:rPr lang="en-US" smtClean="0"/>
-              <a:t>2021-04-10</a:t>
+              <a:t>2021-04-11</a:t>
             </a:fld>
             <a:endParaRPr lang="en-US"/>
           </a:p>
@@ -2991,7 +2994,7 @@
           <a:p>
             <a:fld id="{1313FE7F-F1B9-4A31-B8B0-55D1B638EE13}" type="datetime1">
               <a:rPr lang="en-US" smtClean="0"/>
-              <a:t>2021-04-10</a:t>
+              <a:t>2021-04-11</a:t>
             </a:fld>
             <a:endParaRPr lang="en-US"/>
           </a:p>
@@ -3625,6 +3628,616 @@
       <p:bldP spid="3" grpId="0" build="p"/>
     </p:bldLst>
   </p:timing>
+</p:sld>
+</file>
+
+<file path=ppt/slides/slide10.xml><?xml version="1.0" encoding="utf-8"?>
+<p:sld xmlns:a="http://schemas.openxmlformats.org/drawingml/2006/main" xmlns:r="http://schemas.openxmlformats.org/officeDocument/2006/relationships" xmlns:p="http://schemas.openxmlformats.org/presentationml/2006/main">
+  <p:cSld>
+    <p:spTree>
+      <p:nvGrpSpPr>
+        <p:cNvPr id="1" name=""/>
+        <p:cNvGrpSpPr/>
+        <p:nvPr/>
+      </p:nvGrpSpPr>
+      <p:grpSpPr>
+        <a:xfrm>
+          <a:off x="0" y="0"/>
+          <a:ext cx="0" cy="0"/>
+          <a:chOff x="0" y="0"/>
+          <a:chExt cx="0" cy="0"/>
+        </a:xfrm>
+      </p:grpSpPr>
+      <p:sp>
+        <p:nvSpPr>
+          <p:cNvPr id="2" name="Title 1"/>
+          <p:cNvSpPr>
+            <a:spLocks noGrp="1"/>
+          </p:cNvSpPr>
+          <p:nvPr>
+            <p:ph type="title"/>
+          </p:nvPr>
+        </p:nvSpPr>
+        <p:spPr/>
+        <p:txBody>
+          <a:bodyPr/>
+          <a:lstStyle/>
+          <a:p>
+            <a:r>
+              <a:rPr lang="en-US" dirty="0"/>
+              <a:t>21-3. Lect. </a:t>
+            </a:r>
+            <a:r>
+              <a:rPr lang="en-US" dirty="0" smtClean="0"/>
+              <a:t>7 </a:t>
+            </a:r>
+            <a:r>
+              <a:rPr lang="en-US" dirty="0"/>
+              <a:t>– </a:t>
+            </a:r>
+            <a:r>
+              <a:rPr lang="en-US" dirty="0" smtClean="0"/>
+              <a:t>Requirements</a:t>
+            </a:r>
+            <a:endParaRPr lang="en-US" dirty="0"/>
+          </a:p>
+        </p:txBody>
+      </p:sp>
+      <p:sp>
+        <p:nvSpPr>
+          <p:cNvPr id="3" name="Content Placeholder 2"/>
+          <p:cNvSpPr>
+            <a:spLocks noGrp="1"/>
+          </p:cNvSpPr>
+          <p:nvPr>
+            <p:ph idx="1"/>
+          </p:nvPr>
+        </p:nvSpPr>
+        <p:spPr/>
+        <p:txBody>
+          <a:bodyPr>
+            <a:normAutofit lnSpcReduction="10000"/>
+          </a:bodyPr>
+          <a:lstStyle/>
+          <a:p>
+            <a:r>
+              <a:rPr lang="en-US" dirty="0" smtClean="0"/>
+              <a:t>Requirements need to be written in a precise, testable language</a:t>
+            </a:r>
+          </a:p>
+          <a:p>
+            <a:r>
+              <a:rPr lang="en-US" dirty="0" smtClean="0"/>
+              <a:t>Requirements are supported within the context of the system</a:t>
+            </a:r>
+          </a:p>
+          <a:p>
+            <a:pPr lvl="1"/>
+            <a:r>
+              <a:rPr lang="en-US" dirty="0" smtClean="0"/>
+              <a:t>any conflicting requirements need to be resolved or prioritized</a:t>
+            </a:r>
+          </a:p>
+          <a:p>
+            <a:r>
+              <a:rPr lang="en-US" dirty="0" smtClean="0"/>
+              <a:t>Requirements need to have a measurable tolerance</a:t>
+            </a:r>
+          </a:p>
+          <a:p>
+            <a:r>
+              <a:rPr lang="en-US" dirty="0" smtClean="0"/>
+              <a:t>Requirements do NOT describe implementation; rather, requirements need to describe what the product does</a:t>
+            </a:r>
+          </a:p>
+          <a:p>
+            <a:r>
+              <a:rPr lang="en-US" dirty="0" smtClean="0"/>
+              <a:t>Requirements must follow design constraints</a:t>
+            </a:r>
+          </a:p>
+          <a:p>
+            <a:r>
+              <a:rPr lang="en-US" dirty="0" smtClean="0"/>
+              <a:t>Try to follow EARS: Easy Approach to Requirements Syntax</a:t>
+            </a:r>
+          </a:p>
+          <a:p>
+            <a:pPr lvl="1"/>
+            <a:r>
+              <a:rPr lang="en-US" dirty="0" smtClean="0"/>
+              <a:t>[While/Where &lt;precondition] [when/if &lt;trigger&gt; then] &lt;system&gt; shall &lt;response&gt;</a:t>
+            </a:r>
+          </a:p>
+        </p:txBody>
+      </p:sp>
+      <p:sp>
+        <p:nvSpPr>
+          <p:cNvPr id="4" name="Footer Placeholder 3"/>
+          <p:cNvSpPr>
+            <a:spLocks noGrp="1"/>
+          </p:cNvSpPr>
+          <p:nvPr>
+            <p:ph type="ftr" sz="quarter" idx="11"/>
+          </p:nvPr>
+        </p:nvSpPr>
+        <p:spPr/>
+        <p:txBody>
+          <a:bodyPr/>
+          <a:lstStyle/>
+          <a:p>
+            <a:r>
+              <a:rPr lang="en-US" smtClean="0"/>
+              <a:t>NGUYEN_Todd_noid</a:t>
+            </a:r>
+            <a:endParaRPr lang="en-US"/>
+          </a:p>
+        </p:txBody>
+      </p:sp>
+      <p:sp>
+        <p:nvSpPr>
+          <p:cNvPr id="5" name="Slide Number Placeholder 4"/>
+          <p:cNvSpPr>
+            <a:spLocks noGrp="1"/>
+          </p:cNvSpPr>
+          <p:nvPr>
+            <p:ph type="sldNum" sz="quarter" idx="12"/>
+          </p:nvPr>
+        </p:nvSpPr>
+        <p:spPr/>
+        <p:txBody>
+          <a:bodyPr/>
+          <a:lstStyle/>
+          <a:p>
+            <a:r>
+              <a:rPr lang="en-US" smtClean="0"/>
+              <a:t>/</a:t>
+            </a:r>
+            <a:fld id="{DAAA4506-2605-4298-B94A-EC5D3A4D4A3F}" type="slidenum">
+              <a:rPr lang="en-US" smtClean="0"/>
+              <a:pPr/>
+              <a:t>10</a:t>
+            </a:fld>
+            <a:endParaRPr lang="en-US" dirty="0"/>
+          </a:p>
+        </p:txBody>
+      </p:sp>
+    </p:spTree>
+    <p:extLst>
+      <p:ext uri="{BB962C8B-B14F-4D97-AF65-F5344CB8AC3E}">
+        <p14:creationId xmlns:p14="http://schemas.microsoft.com/office/powerpoint/2010/main" val="921740934"/>
+      </p:ext>
+    </p:extLst>
+  </p:cSld>
+  <p:clrMapOvr>
+    <a:masterClrMapping/>
+  </p:clrMapOvr>
+</p:sld>
+</file>
+
+<file path=ppt/slides/slide11.xml><?xml version="1.0" encoding="utf-8"?>
+<p:sld xmlns:a="http://schemas.openxmlformats.org/drawingml/2006/main" xmlns:r="http://schemas.openxmlformats.org/officeDocument/2006/relationships" xmlns:p="http://schemas.openxmlformats.org/presentationml/2006/main">
+  <p:cSld>
+    <p:spTree>
+      <p:nvGrpSpPr>
+        <p:cNvPr id="1" name=""/>
+        <p:cNvGrpSpPr/>
+        <p:nvPr/>
+      </p:nvGrpSpPr>
+      <p:grpSpPr>
+        <a:xfrm>
+          <a:off x="0" y="0"/>
+          <a:ext cx="0" cy="0"/>
+          <a:chOff x="0" y="0"/>
+          <a:chExt cx="0" cy="0"/>
+        </a:xfrm>
+      </p:grpSpPr>
+      <p:sp>
+        <p:nvSpPr>
+          <p:cNvPr id="2" name="Title 1"/>
+          <p:cNvSpPr>
+            <a:spLocks noGrp="1"/>
+          </p:cNvSpPr>
+          <p:nvPr>
+            <p:ph type="title"/>
+          </p:nvPr>
+        </p:nvSpPr>
+        <p:spPr/>
+        <p:txBody>
+          <a:bodyPr/>
+          <a:lstStyle/>
+          <a:p>
+            <a:r>
+              <a:rPr lang="en-US" dirty="0"/>
+              <a:t>21-3. Lect. </a:t>
+            </a:r>
+            <a:r>
+              <a:rPr lang="en-US" dirty="0" smtClean="0"/>
+              <a:t>8 – Global Variables</a:t>
+            </a:r>
+            <a:endParaRPr lang="en-US" dirty="0"/>
+          </a:p>
+        </p:txBody>
+      </p:sp>
+      <p:sp>
+        <p:nvSpPr>
+          <p:cNvPr id="3" name="Content Placeholder 2"/>
+          <p:cNvSpPr>
+            <a:spLocks noGrp="1"/>
+          </p:cNvSpPr>
+          <p:nvPr>
+            <p:ph idx="1"/>
+          </p:nvPr>
+        </p:nvSpPr>
+        <p:spPr/>
+        <p:txBody>
+          <a:bodyPr/>
+          <a:lstStyle/>
+          <a:p>
+            <a:r>
+              <a:rPr lang="en-US" dirty="0" smtClean="0"/>
+              <a:t>Global variables are evil! Only have a few read/write </a:t>
+            </a:r>
+            <a:r>
+              <a:rPr lang="en-US" dirty="0" err="1" smtClean="0"/>
+              <a:t>globals</a:t>
+            </a:r>
+            <a:endParaRPr lang="en-US" dirty="0" smtClean="0"/>
+          </a:p>
+          <a:p>
+            <a:pPr lvl="1"/>
+            <a:r>
+              <a:rPr lang="en-US" dirty="0" smtClean="0"/>
+              <a:t>Use of </a:t>
+            </a:r>
+            <a:r>
+              <a:rPr lang="en-US" dirty="0" err="1" smtClean="0"/>
+              <a:t>globals</a:t>
+            </a:r>
+            <a:r>
+              <a:rPr lang="en-US" dirty="0" smtClean="0"/>
+              <a:t> indicate poor modularity</a:t>
+            </a:r>
+          </a:p>
+          <a:p>
+            <a:r>
+              <a:rPr lang="en-US" dirty="0" err="1" smtClean="0"/>
+              <a:t>Globals</a:t>
+            </a:r>
+            <a:r>
+              <a:rPr lang="en-US" dirty="0" smtClean="0"/>
+              <a:t> increase complexity</a:t>
+            </a:r>
+          </a:p>
+          <a:p>
+            <a:r>
+              <a:rPr lang="en-US" dirty="0" smtClean="0"/>
+              <a:t>File static can only be seen inside .c file; similar to "private"</a:t>
+            </a:r>
+          </a:p>
+          <a:p>
+            <a:r>
+              <a:rPr lang="en-US" dirty="0" smtClean="0"/>
+              <a:t>Arrange .c files based on access to data</a:t>
+            </a:r>
+          </a:p>
+          <a:p>
+            <a:r>
+              <a:rPr lang="en-US" dirty="0" smtClean="0"/>
+              <a:t>Use </a:t>
+            </a:r>
+            <a:r>
+              <a:rPr lang="en-US" dirty="0" err="1" smtClean="0"/>
+              <a:t>accessor</a:t>
+            </a:r>
+            <a:r>
+              <a:rPr lang="en-US" dirty="0" smtClean="0"/>
+              <a:t> functions (getters / functions that increments the variable) instead of allowing access to variables directly</a:t>
+            </a:r>
+            <a:endParaRPr lang="en-US" dirty="0"/>
+          </a:p>
+        </p:txBody>
+      </p:sp>
+      <p:sp>
+        <p:nvSpPr>
+          <p:cNvPr id="4" name="Footer Placeholder 3"/>
+          <p:cNvSpPr>
+            <a:spLocks noGrp="1"/>
+          </p:cNvSpPr>
+          <p:nvPr>
+            <p:ph type="ftr" sz="quarter" idx="11"/>
+          </p:nvPr>
+        </p:nvSpPr>
+        <p:spPr/>
+        <p:txBody>
+          <a:bodyPr/>
+          <a:lstStyle/>
+          <a:p>
+            <a:r>
+              <a:rPr lang="en-US" smtClean="0"/>
+              <a:t>NGUYEN_Todd_noid</a:t>
+            </a:r>
+            <a:endParaRPr lang="en-US"/>
+          </a:p>
+        </p:txBody>
+      </p:sp>
+      <p:sp>
+        <p:nvSpPr>
+          <p:cNvPr id="5" name="Slide Number Placeholder 4"/>
+          <p:cNvSpPr>
+            <a:spLocks noGrp="1"/>
+          </p:cNvSpPr>
+          <p:nvPr>
+            <p:ph type="sldNum" sz="quarter" idx="12"/>
+          </p:nvPr>
+        </p:nvSpPr>
+        <p:spPr/>
+        <p:txBody>
+          <a:bodyPr/>
+          <a:lstStyle/>
+          <a:p>
+            <a:r>
+              <a:rPr lang="en-US" smtClean="0"/>
+              <a:t>/</a:t>
+            </a:r>
+            <a:fld id="{DAAA4506-2605-4298-B94A-EC5D3A4D4A3F}" type="slidenum">
+              <a:rPr lang="en-US" smtClean="0"/>
+              <a:pPr/>
+              <a:t>11</a:t>
+            </a:fld>
+            <a:endParaRPr lang="en-US" dirty="0"/>
+          </a:p>
+        </p:txBody>
+      </p:sp>
+    </p:spTree>
+    <p:extLst>
+      <p:ext uri="{BB962C8B-B14F-4D97-AF65-F5344CB8AC3E}">
+        <p14:creationId xmlns:p14="http://schemas.microsoft.com/office/powerpoint/2010/main" val="3913286961"/>
+      </p:ext>
+    </p:extLst>
+  </p:cSld>
+  <p:clrMapOvr>
+    <a:masterClrMapping/>
+  </p:clrMapOvr>
+</p:sld>
+</file>
+
+<file path=ppt/slides/slide12.xml><?xml version="1.0" encoding="utf-8"?>
+<p:sld xmlns:a="http://schemas.openxmlformats.org/drawingml/2006/main" xmlns:r="http://schemas.openxmlformats.org/officeDocument/2006/relationships" xmlns:p="http://schemas.openxmlformats.org/presentationml/2006/main">
+  <p:cSld>
+    <p:spTree>
+      <p:nvGrpSpPr>
+        <p:cNvPr id="1" name=""/>
+        <p:cNvGrpSpPr/>
+        <p:nvPr/>
+      </p:nvGrpSpPr>
+      <p:grpSpPr>
+        <a:xfrm>
+          <a:off x="0" y="0"/>
+          <a:ext cx="0" cy="0"/>
+          <a:chOff x="0" y="0"/>
+          <a:chExt cx="0" cy="0"/>
+        </a:xfrm>
+      </p:grpSpPr>
+      <p:sp>
+        <p:nvSpPr>
+          <p:cNvPr id="2" name="Title 1"/>
+          <p:cNvSpPr>
+            <a:spLocks noGrp="1"/>
+          </p:cNvSpPr>
+          <p:nvPr>
+            <p:ph type="title"/>
+          </p:nvPr>
+        </p:nvSpPr>
+        <p:spPr/>
+        <p:txBody>
+          <a:bodyPr/>
+          <a:lstStyle/>
+          <a:p>
+            <a:r>
+              <a:rPr lang="en-US" dirty="0"/>
+              <a:t>21-3. Lect. </a:t>
+            </a:r>
+            <a:r>
+              <a:rPr lang="en-US" dirty="0" smtClean="0"/>
+              <a:t>9 </a:t>
+            </a:r>
+            <a:r>
+              <a:rPr lang="en-US" dirty="0"/>
+              <a:t>– </a:t>
+            </a:r>
+            <a:r>
+              <a:rPr lang="en-US" dirty="0" smtClean="0"/>
+              <a:t>Spaghetti</a:t>
+            </a:r>
+            <a:endParaRPr lang="en-US" dirty="0"/>
+          </a:p>
+        </p:txBody>
+      </p:sp>
+      <p:sp>
+        <p:nvSpPr>
+          <p:cNvPr id="3" name="Content Placeholder 2"/>
+          <p:cNvSpPr>
+            <a:spLocks noGrp="1"/>
+          </p:cNvSpPr>
+          <p:nvPr>
+            <p:ph idx="1"/>
+          </p:nvPr>
+        </p:nvSpPr>
+        <p:spPr/>
+        <p:txBody>
+          <a:bodyPr>
+            <a:normAutofit fontScale="85000" lnSpcReduction="20000"/>
+          </a:bodyPr>
+          <a:lstStyle/>
+          <a:p>
+            <a:r>
+              <a:rPr lang="en-US" dirty="0" smtClean="0"/>
+              <a:t>Unstructured code leads to bugs, as unstructured code is generally hard to understand, test, and review</a:t>
+            </a:r>
+          </a:p>
+          <a:p>
+            <a:pPr lvl="1"/>
+            <a:r>
+              <a:rPr lang="en-US" dirty="0" smtClean="0"/>
+              <a:t>We need to limit complexity within each unit / subroutine / method</a:t>
+            </a:r>
+          </a:p>
+          <a:p>
+            <a:r>
+              <a:rPr lang="en-US" dirty="0" smtClean="0"/>
+              <a:t>McCabe </a:t>
+            </a:r>
+            <a:r>
+              <a:rPr lang="en-US" dirty="0" err="1" smtClean="0"/>
+              <a:t>Cyclomatic</a:t>
+            </a:r>
+            <a:r>
+              <a:rPr lang="en-US" dirty="0" smtClean="0"/>
+              <a:t> Complexity (MCC) can measure each module</a:t>
+            </a:r>
+          </a:p>
+          <a:p>
+            <a:pPr lvl="1"/>
+            <a:r>
+              <a:rPr lang="en-US" dirty="0" smtClean="0"/>
+              <a:t>Maximum MCC should be in the range of 10 - 15</a:t>
+            </a:r>
+          </a:p>
+          <a:p>
+            <a:r>
+              <a:rPr lang="en-US" dirty="0" smtClean="0"/>
+              <a:t>Strict </a:t>
+            </a:r>
+            <a:r>
+              <a:rPr lang="en-US" dirty="0" err="1" smtClean="0"/>
+              <a:t>Cyclomatic</a:t>
+            </a:r>
+            <a:r>
+              <a:rPr lang="en-US" dirty="0" smtClean="0"/>
+              <a:t> Complexity (SCC) counts </a:t>
+            </a:r>
+            <a:r>
+              <a:rPr lang="en-US" dirty="0"/>
+              <a:t>complexity using their control flow (if </a:t>
+            </a:r>
+            <a:r>
+              <a:rPr lang="en-US" dirty="0" smtClean="0"/>
+              <a:t>statements </a:t>
+            </a:r>
+            <a:r>
+              <a:rPr lang="en-US" dirty="0"/>
+              <a:t>/ </a:t>
+            </a:r>
+            <a:r>
+              <a:rPr lang="en-US" dirty="0" smtClean="0"/>
+              <a:t>conditionals</a:t>
+            </a:r>
+          </a:p>
+          <a:p>
+            <a:r>
+              <a:rPr lang="en-US" dirty="0" smtClean="0"/>
+              <a:t>Spaghetti Factor: SF = SCC + (</a:t>
+            </a:r>
+            <a:r>
+              <a:rPr lang="en-US" dirty="0" err="1" smtClean="0"/>
+              <a:t>Globals</a:t>
+            </a:r>
+            <a:r>
+              <a:rPr lang="en-US" dirty="0" smtClean="0"/>
+              <a:t> * 5) + (SLOC / 20)</a:t>
+            </a:r>
+          </a:p>
+          <a:p>
+            <a:pPr lvl="1"/>
+            <a:r>
+              <a:rPr lang="en-US" dirty="0" smtClean="0"/>
+              <a:t>want to be between 5-10, and don't go above 15</a:t>
+            </a:r>
+          </a:p>
+          <a:p>
+            <a:r>
+              <a:rPr lang="en-US" dirty="0"/>
+              <a:t>The purpose of the complexity measurements is to split up complex code into smaller </a:t>
+            </a:r>
+            <a:r>
+              <a:rPr lang="en-US" dirty="0" smtClean="0"/>
+              <a:t>pieces</a:t>
+            </a:r>
+          </a:p>
+          <a:p>
+            <a:pPr lvl="1"/>
+            <a:r>
+              <a:rPr lang="en-US" dirty="0" smtClean="0"/>
+              <a:t>Don't have nested if statements / don't excessively use `break`, `continue`, or multiple `returns`</a:t>
+            </a:r>
+          </a:p>
+          <a:p>
+            <a:endParaRPr lang="en-US" dirty="0" smtClean="0"/>
+          </a:p>
+        </p:txBody>
+      </p:sp>
+      <p:sp>
+        <p:nvSpPr>
+          <p:cNvPr id="4" name="Footer Placeholder 3"/>
+          <p:cNvSpPr>
+            <a:spLocks noGrp="1"/>
+          </p:cNvSpPr>
+          <p:nvPr>
+            <p:ph type="ftr" sz="quarter" idx="11"/>
+          </p:nvPr>
+        </p:nvSpPr>
+        <p:spPr/>
+        <p:txBody>
+          <a:bodyPr/>
+          <a:lstStyle/>
+          <a:p>
+            <a:r>
+              <a:rPr lang="en-US" smtClean="0"/>
+              <a:t>NGUYEN_Todd_noid</a:t>
+            </a:r>
+            <a:endParaRPr lang="en-US"/>
+          </a:p>
+        </p:txBody>
+      </p:sp>
+      <p:sp>
+        <p:nvSpPr>
+          <p:cNvPr id="5" name="Slide Number Placeholder 4"/>
+          <p:cNvSpPr>
+            <a:spLocks noGrp="1"/>
+          </p:cNvSpPr>
+          <p:nvPr>
+            <p:ph type="sldNum" sz="quarter" idx="12"/>
+          </p:nvPr>
+        </p:nvSpPr>
+        <p:spPr/>
+        <p:txBody>
+          <a:bodyPr/>
+          <a:lstStyle/>
+          <a:p>
+            <a:r>
+              <a:rPr lang="en-US" smtClean="0"/>
+              <a:t>/</a:t>
+            </a:r>
+            <a:fld id="{DAAA4506-2605-4298-B94A-EC5D3A4D4A3F}" type="slidenum">
+              <a:rPr lang="en-US" smtClean="0"/>
+              <a:pPr/>
+              <a:t>12</a:t>
+            </a:fld>
+            <a:endParaRPr lang="en-US" dirty="0"/>
+          </a:p>
+        </p:txBody>
+      </p:sp>
+    </p:spTree>
+    <p:extLst>
+      <p:ext uri="{BB962C8B-B14F-4D97-AF65-F5344CB8AC3E}">
+        <p14:creationId xmlns:p14="http://schemas.microsoft.com/office/powerpoint/2010/main" val="3195393286"/>
+      </p:ext>
+    </p:extLst>
+  </p:cSld>
+  <p:clrMapOvr>
+    <a:masterClrMapping/>
+  </p:clrMapOvr>
 </p:sld>
 </file>
 

</xml_diff>

<commit_message>
HW21: Finish with Lecture 17 and 18
</commit_message>
<xml_diff>
--- a/ece-18-642/lec-20-to-24/hw21/HW21_NGUYEN_Todd_noid.pptx
+++ b/ece-18-642/lec-20-to-24/hw21/HW21_NGUYEN_Todd_noid.pptx
@@ -2,10 +2,10 @@
 <file path=ppt/presentation.xml><?xml version="1.0" encoding="utf-8"?>
 <p:presentation xmlns:a="http://schemas.openxmlformats.org/drawingml/2006/main" xmlns:r="http://schemas.openxmlformats.org/officeDocument/2006/relationships" xmlns:p="http://schemas.openxmlformats.org/presentationml/2006/main" saveSubsetFonts="1">
   <p:sldMasterIdLst>
-    <p:sldMasterId id="2147483744" r:id="rId1"/>
+    <p:sldMasterId id="2147483810" r:id="rId1"/>
   </p:sldMasterIdLst>
   <p:notesMasterIdLst>
-    <p:notesMasterId r:id="rId21"/>
+    <p:notesMasterId r:id="rId24"/>
   </p:notesMasterIdLst>
   <p:sldIdLst>
     <p:sldId id="258" r:id="rId2"/>
@@ -27,6 +27,9 @@
     <p:sldId id="274" r:id="rId18"/>
     <p:sldId id="275" r:id="rId19"/>
     <p:sldId id="276" r:id="rId20"/>
+    <p:sldId id="277" r:id="rId21"/>
+    <p:sldId id="278" r:id="rId22"/>
+    <p:sldId id="279" r:id="rId23"/>
   </p:sldIdLst>
   <p:sldSz cx="12192000" cy="6858000"/>
   <p:notesSz cx="6858000" cy="9144000"/>
@@ -34,7 +37,7 @@
     <a:defPPr>
       <a:defRPr lang="en-US"/>
     </a:defPPr>
-    <a:lvl1pPr marL="0" algn="l" defTabSz="457200" rtl="0" eaLnBrk="1" latinLnBrk="0" hangingPunct="1">
+    <a:lvl1pPr marL="0" algn="l" defTabSz="914400" rtl="0" eaLnBrk="1" latinLnBrk="0" hangingPunct="1">
       <a:defRPr sz="1800" kern="1200">
         <a:solidFill>
           <a:schemeClr val="tx1"/>
@@ -44,7 +47,7 @@
         <a:cs typeface="+mn-cs"/>
       </a:defRPr>
     </a:lvl1pPr>
-    <a:lvl2pPr marL="457200" algn="l" defTabSz="457200" rtl="0" eaLnBrk="1" latinLnBrk="0" hangingPunct="1">
+    <a:lvl2pPr marL="457200" algn="l" defTabSz="914400" rtl="0" eaLnBrk="1" latinLnBrk="0" hangingPunct="1">
       <a:defRPr sz="1800" kern="1200">
         <a:solidFill>
           <a:schemeClr val="tx1"/>
@@ -54,7 +57,7 @@
         <a:cs typeface="+mn-cs"/>
       </a:defRPr>
     </a:lvl2pPr>
-    <a:lvl3pPr marL="914400" algn="l" defTabSz="457200" rtl="0" eaLnBrk="1" latinLnBrk="0" hangingPunct="1">
+    <a:lvl3pPr marL="914400" algn="l" defTabSz="914400" rtl="0" eaLnBrk="1" latinLnBrk="0" hangingPunct="1">
       <a:defRPr sz="1800" kern="1200">
         <a:solidFill>
           <a:schemeClr val="tx1"/>
@@ -64,7 +67,7 @@
         <a:cs typeface="+mn-cs"/>
       </a:defRPr>
     </a:lvl3pPr>
-    <a:lvl4pPr marL="1371600" algn="l" defTabSz="457200" rtl="0" eaLnBrk="1" latinLnBrk="0" hangingPunct="1">
+    <a:lvl4pPr marL="1371600" algn="l" defTabSz="914400" rtl="0" eaLnBrk="1" latinLnBrk="0" hangingPunct="1">
       <a:defRPr sz="1800" kern="1200">
         <a:solidFill>
           <a:schemeClr val="tx1"/>
@@ -74,7 +77,7 @@
         <a:cs typeface="+mn-cs"/>
       </a:defRPr>
     </a:lvl4pPr>
-    <a:lvl5pPr marL="1828800" algn="l" defTabSz="457200" rtl="0" eaLnBrk="1" latinLnBrk="0" hangingPunct="1">
+    <a:lvl5pPr marL="1828800" algn="l" defTabSz="914400" rtl="0" eaLnBrk="1" latinLnBrk="0" hangingPunct="1">
       <a:defRPr sz="1800" kern="1200">
         <a:solidFill>
           <a:schemeClr val="tx1"/>
@@ -84,7 +87,7 @@
         <a:cs typeface="+mn-cs"/>
       </a:defRPr>
     </a:lvl5pPr>
-    <a:lvl6pPr marL="2286000" algn="l" defTabSz="457200" rtl="0" eaLnBrk="1" latinLnBrk="0" hangingPunct="1">
+    <a:lvl6pPr marL="2286000" algn="l" defTabSz="914400" rtl="0" eaLnBrk="1" latinLnBrk="0" hangingPunct="1">
       <a:defRPr sz="1800" kern="1200">
         <a:solidFill>
           <a:schemeClr val="tx1"/>
@@ -94,7 +97,7 @@
         <a:cs typeface="+mn-cs"/>
       </a:defRPr>
     </a:lvl6pPr>
-    <a:lvl7pPr marL="2743200" algn="l" defTabSz="457200" rtl="0" eaLnBrk="1" latinLnBrk="0" hangingPunct="1">
+    <a:lvl7pPr marL="2743200" algn="l" defTabSz="914400" rtl="0" eaLnBrk="1" latinLnBrk="0" hangingPunct="1">
       <a:defRPr sz="1800" kern="1200">
         <a:solidFill>
           <a:schemeClr val="tx1"/>
@@ -104,7 +107,7 @@
         <a:cs typeface="+mn-cs"/>
       </a:defRPr>
     </a:lvl7pPr>
-    <a:lvl8pPr marL="3200400" algn="l" defTabSz="457200" rtl="0" eaLnBrk="1" latinLnBrk="0" hangingPunct="1">
+    <a:lvl8pPr marL="3200400" algn="l" defTabSz="914400" rtl="0" eaLnBrk="1" latinLnBrk="0" hangingPunct="1">
       <a:defRPr sz="1800" kern="1200">
         <a:solidFill>
           <a:schemeClr val="tx1"/>
@@ -114,7 +117,7 @@
         <a:cs typeface="+mn-cs"/>
       </a:defRPr>
     </a:lvl8pPr>
-    <a:lvl9pPr marL="3657600" algn="l" defTabSz="457200" rtl="0" eaLnBrk="1" latinLnBrk="0" hangingPunct="1">
+    <a:lvl9pPr marL="3657600" algn="l" defTabSz="914400" rtl="0" eaLnBrk="1" latinLnBrk="0" hangingPunct="1">
       <a:defRPr sz="1800" kern="1200">
         <a:solidFill>
           <a:schemeClr val="tx1"/>
@@ -531,7 +534,7 @@
               <a:rPr lang="en-US" smtClean="0"/>
               <a:t>Click to edit Master title style</a:t>
             </a:r>
-            <a:endParaRPr lang="en-US" dirty="0"/>
+            <a:endParaRPr lang="en-US"/>
           </a:p>
         </p:txBody>
       </p:sp>
@@ -596,7 +599,7 @@
               <a:rPr lang="en-US" smtClean="0"/>
               <a:t>Click to edit Master subtitle style</a:t>
             </a:r>
-            <a:endParaRPr lang="en-US" dirty="0"/>
+            <a:endParaRPr lang="en-US"/>
           </a:p>
         </p:txBody>
       </p:sp>
@@ -661,10 +664,6 @@
           <a:bodyPr/>
           <a:lstStyle/>
           <a:p>
-            <a:r>
-              <a:rPr lang="en-US" smtClean="0"/>
-              <a:t>/</a:t>
-            </a:r>
             <a:fld id="{DAAA4506-2605-4298-B94A-EC5D3A4D4A3F}" type="slidenum">
               <a:rPr lang="en-US" smtClean="0"/>
               <a:pPr/>
@@ -677,20 +676,13 @@
     </p:spTree>
     <p:extLst>
       <p:ext uri="{BB962C8B-B14F-4D97-AF65-F5344CB8AC3E}">
-        <p14:creationId xmlns:p14="http://schemas.microsoft.com/office/powerpoint/2010/main" val="1495315057"/>
+        <p14:creationId xmlns:p14="http://schemas.microsoft.com/office/powerpoint/2010/main" val="1422501518"/>
       </p:ext>
     </p:extLst>
   </p:cSld>
   <p:clrMapOvr>
     <a:masterClrMapping/>
   </p:clrMapOvr>
-  <p:timing>
-    <p:tnLst>
-      <p:par>
-        <p:cTn id="1" dur="indefinite" restart="never" nodeType="tmRoot"/>
-      </p:par>
-    </p:tnLst>
-  </p:timing>
 </p:sldLayout>
 </file>
 
@@ -730,7 +722,7 @@
               <a:rPr lang="en-US" smtClean="0"/>
               <a:t>Click to edit Master title style</a:t>
             </a:r>
-            <a:endParaRPr lang="en-US" dirty="0"/>
+            <a:endParaRPr lang="en-US"/>
           </a:p>
         </p:txBody>
       </p:sp>
@@ -782,7 +774,7 @@
               <a:rPr lang="en-US" smtClean="0"/>
               <a:t>Fifth level</a:t>
             </a:r>
-            <a:endParaRPr lang="en-US" dirty="0"/>
+            <a:endParaRPr lang="en-US"/>
           </a:p>
         </p:txBody>
       </p:sp>
@@ -858,7 +850,7 @@
     </p:spTree>
     <p:extLst>
       <p:ext uri="{BB962C8B-B14F-4D97-AF65-F5344CB8AC3E}">
-        <p14:creationId xmlns:p14="http://schemas.microsoft.com/office/powerpoint/2010/main" val="1281437115"/>
+        <p14:creationId xmlns:p14="http://schemas.microsoft.com/office/powerpoint/2010/main" val="2143249335"/>
       </p:ext>
     </p:extLst>
   </p:cSld>
@@ -909,7 +901,7 @@
               <a:rPr lang="en-US" smtClean="0"/>
               <a:t>Click to edit Master title style</a:t>
             </a:r>
-            <a:endParaRPr lang="en-US" dirty="0"/>
+            <a:endParaRPr lang="en-US"/>
           </a:p>
         </p:txBody>
       </p:sp>
@@ -966,7 +958,7 @@
               <a:rPr lang="en-US" smtClean="0"/>
               <a:t>Fifth level</a:t>
             </a:r>
-            <a:endParaRPr lang="en-US" dirty="0"/>
+            <a:endParaRPr lang="en-US"/>
           </a:p>
         </p:txBody>
       </p:sp>
@@ -1042,7 +1034,7 @@
     </p:spTree>
     <p:extLst>
       <p:ext uri="{BB962C8B-B14F-4D97-AF65-F5344CB8AC3E}">
-        <p14:creationId xmlns:p14="http://schemas.microsoft.com/office/powerpoint/2010/main" val="178547456"/>
+        <p14:creationId xmlns:p14="http://schemas.microsoft.com/office/powerpoint/2010/main" val="489186641"/>
       </p:ext>
     </p:extLst>
   </p:cSld>
@@ -1088,7 +1080,7 @@
               <a:rPr lang="en-US" smtClean="0"/>
               <a:t>Click to edit Master title style</a:t>
             </a:r>
-            <a:endParaRPr lang="en-US" dirty="0"/>
+            <a:endParaRPr lang="en-US"/>
           </a:p>
         </p:txBody>
       </p:sp>
@@ -1140,7 +1132,7 @@
               <a:rPr lang="en-US" smtClean="0"/>
               <a:t>Fifth level</a:t>
             </a:r>
-            <a:endParaRPr lang="en-US" dirty="0"/>
+            <a:endParaRPr lang="en-US"/>
           </a:p>
         </p:txBody>
       </p:sp>
@@ -1205,10 +1197,6 @@
           <a:bodyPr/>
           <a:lstStyle/>
           <a:p>
-            <a:r>
-              <a:rPr lang="en-US" smtClean="0"/>
-              <a:t>/</a:t>
-            </a:r>
             <a:fld id="{DAAA4506-2605-4298-B94A-EC5D3A4D4A3F}" type="slidenum">
               <a:rPr lang="en-US" smtClean="0"/>
               <a:pPr/>
@@ -1221,20 +1209,13 @@
     </p:spTree>
     <p:extLst>
       <p:ext uri="{BB962C8B-B14F-4D97-AF65-F5344CB8AC3E}">
-        <p14:creationId xmlns:p14="http://schemas.microsoft.com/office/powerpoint/2010/main" val="3865047643"/>
+        <p14:creationId xmlns:p14="http://schemas.microsoft.com/office/powerpoint/2010/main" val="649641436"/>
       </p:ext>
     </p:extLst>
   </p:cSld>
   <p:clrMapOvr>
     <a:masterClrMapping/>
   </p:clrMapOvr>
-  <p:timing>
-    <p:tnLst>
-      <p:par>
-        <p:cTn id="1" dur="indefinite" restart="never" nodeType="tmRoot"/>
-      </p:par>
-    </p:tnLst>
-  </p:timing>
 </p:sldLayout>
 </file>
 
@@ -1283,7 +1264,7 @@
               <a:rPr lang="en-US" smtClean="0"/>
               <a:t>Click to edit Master title style</a:t>
             </a:r>
-            <a:endParaRPr lang="en-US" dirty="0"/>
+            <a:endParaRPr lang="en-US"/>
           </a:p>
         </p:txBody>
       </p:sp>
@@ -1467,10 +1448,6 @@
           <a:bodyPr/>
           <a:lstStyle/>
           <a:p>
-            <a:r>
-              <a:rPr lang="en-US" smtClean="0"/>
-              <a:t>/</a:t>
-            </a:r>
             <a:fld id="{DAAA4506-2605-4298-B94A-EC5D3A4D4A3F}" type="slidenum">
               <a:rPr lang="en-US" smtClean="0"/>
               <a:pPr/>
@@ -1483,7 +1460,7 @@
     </p:spTree>
     <p:extLst>
       <p:ext uri="{BB962C8B-B14F-4D97-AF65-F5344CB8AC3E}">
-        <p14:creationId xmlns:p14="http://schemas.microsoft.com/office/powerpoint/2010/main" val="232894586"/>
+        <p14:creationId xmlns:p14="http://schemas.microsoft.com/office/powerpoint/2010/main" val="2096039353"/>
       </p:ext>
     </p:extLst>
   </p:cSld>
@@ -1529,7 +1506,7 @@
               <a:rPr lang="en-US" smtClean="0"/>
               <a:t>Click to edit Master title style</a:t>
             </a:r>
-            <a:endParaRPr lang="en-US" dirty="0"/>
+            <a:endParaRPr lang="en-US"/>
           </a:p>
         </p:txBody>
       </p:sp>
@@ -1586,7 +1563,7 @@
               <a:rPr lang="en-US" smtClean="0"/>
               <a:t>Fifth level</a:t>
             </a:r>
-            <a:endParaRPr lang="en-US" dirty="0"/>
+            <a:endParaRPr lang="en-US"/>
           </a:p>
         </p:txBody>
       </p:sp>
@@ -1643,7 +1620,7 @@
               <a:rPr lang="en-US" smtClean="0"/>
               <a:t>Fifth level</a:t>
             </a:r>
-            <a:endParaRPr lang="en-US" dirty="0"/>
+            <a:endParaRPr lang="en-US"/>
           </a:p>
         </p:txBody>
       </p:sp>
@@ -1719,7 +1696,7 @@
     </p:spTree>
     <p:extLst>
       <p:ext uri="{BB962C8B-B14F-4D97-AF65-F5344CB8AC3E}">
-        <p14:creationId xmlns:p14="http://schemas.microsoft.com/office/powerpoint/2010/main" val="4120552411"/>
+        <p14:creationId xmlns:p14="http://schemas.microsoft.com/office/powerpoint/2010/main" val="228622543"/>
       </p:ext>
     </p:extLst>
   </p:cSld>
@@ -1770,7 +1747,7 @@
               <a:rPr lang="en-US" smtClean="0"/>
               <a:t>Click to edit Master title style</a:t>
             </a:r>
-            <a:endParaRPr lang="en-US" dirty="0"/>
+            <a:endParaRPr lang="en-US"/>
           </a:p>
         </p:txBody>
       </p:sp>
@@ -1892,7 +1869,7 @@
               <a:rPr lang="en-US" smtClean="0"/>
               <a:t>Fifth level</a:t>
             </a:r>
-            <a:endParaRPr lang="en-US" dirty="0"/>
+            <a:endParaRPr lang="en-US"/>
           </a:p>
         </p:txBody>
       </p:sp>
@@ -2014,7 +1991,7 @@
               <a:rPr lang="en-US" smtClean="0"/>
               <a:t>Fifth level</a:t>
             </a:r>
-            <a:endParaRPr lang="en-US" dirty="0"/>
+            <a:endParaRPr lang="en-US"/>
           </a:p>
         </p:txBody>
       </p:sp>
@@ -2090,7 +2067,7 @@
     </p:spTree>
     <p:extLst>
       <p:ext uri="{BB962C8B-B14F-4D97-AF65-F5344CB8AC3E}">
-        <p14:creationId xmlns:p14="http://schemas.microsoft.com/office/powerpoint/2010/main" val="1883587777"/>
+        <p14:creationId xmlns:p14="http://schemas.microsoft.com/office/powerpoint/2010/main" val="1142475461"/>
       </p:ext>
     </p:extLst>
   </p:cSld>
@@ -2136,7 +2113,7 @@
               <a:rPr lang="en-US" smtClean="0"/>
               <a:t>Click to edit Master title style</a:t>
             </a:r>
-            <a:endParaRPr lang="en-US" dirty="0"/>
+            <a:endParaRPr lang="en-US"/>
           </a:p>
         </p:txBody>
       </p:sp>
@@ -2212,7 +2189,7 @@
     </p:spTree>
     <p:extLst>
       <p:ext uri="{BB962C8B-B14F-4D97-AF65-F5344CB8AC3E}">
-        <p14:creationId xmlns:p14="http://schemas.microsoft.com/office/powerpoint/2010/main" val="2765984000"/>
+        <p14:creationId xmlns:p14="http://schemas.microsoft.com/office/powerpoint/2010/main" val="1473808812"/>
       </p:ext>
     </p:extLst>
   </p:cSld>
@@ -2311,7 +2288,7 @@
     </p:spTree>
     <p:extLst>
       <p:ext uri="{BB962C8B-B14F-4D97-AF65-F5344CB8AC3E}">
-        <p14:creationId xmlns:p14="http://schemas.microsoft.com/office/powerpoint/2010/main" val="2430364917"/>
+        <p14:creationId xmlns:p14="http://schemas.microsoft.com/office/powerpoint/2010/main" val="3394243705"/>
       </p:ext>
     </p:extLst>
   </p:cSld>
@@ -2366,7 +2343,7 @@
               <a:rPr lang="en-US" smtClean="0"/>
               <a:t>Click to edit Master title style</a:t>
             </a:r>
-            <a:endParaRPr lang="en-US" dirty="0"/>
+            <a:endParaRPr lang="en-US"/>
           </a:p>
         </p:txBody>
       </p:sp>
@@ -2451,7 +2428,7 @@
               <a:rPr lang="en-US" smtClean="0"/>
               <a:t>Fifth level</a:t>
             </a:r>
-            <a:endParaRPr lang="en-US" dirty="0"/>
+            <a:endParaRPr lang="en-US"/>
           </a:p>
         </p:txBody>
       </p:sp>
@@ -2592,7 +2569,7 @@
     </p:spTree>
     <p:extLst>
       <p:ext uri="{BB962C8B-B14F-4D97-AF65-F5344CB8AC3E}">
-        <p14:creationId xmlns:p14="http://schemas.microsoft.com/office/powerpoint/2010/main" val="4164900459"/>
+        <p14:creationId xmlns:p14="http://schemas.microsoft.com/office/powerpoint/2010/main" val="1038079188"/>
       </p:ext>
     </p:extLst>
   </p:cSld>
@@ -2647,7 +2624,7 @@
               <a:rPr lang="en-US" smtClean="0"/>
               <a:t>Click to edit Master title style</a:t>
             </a:r>
-            <a:endParaRPr lang="en-US" dirty="0"/>
+            <a:endParaRPr lang="en-US"/>
           </a:p>
         </p:txBody>
       </p:sp>
@@ -2655,7 +2632,7 @@
         <p:nvSpPr>
           <p:cNvPr id="3" name="Picture Placeholder 2"/>
           <p:cNvSpPr>
-            <a:spLocks noGrp="1" noChangeAspect="1"/>
+            <a:spLocks noGrp="1"/>
           </p:cNvSpPr>
           <p:nvPr>
             <p:ph type="pic" idx="1"/>
@@ -2668,7 +2645,7 @@
           </a:xfrm>
         </p:spPr>
         <p:txBody>
-          <a:bodyPr anchor="t"/>
+          <a:bodyPr/>
           <a:lstStyle>
             <a:lvl1pPr marL="0" indent="0">
               <a:buNone/>
@@ -2708,11 +2685,7 @@
             </a:lvl9pPr>
           </a:lstStyle>
           <a:p>
-            <a:r>
-              <a:rPr lang="en-US" smtClean="0"/>
-              <a:t>Click icon to add picture</a:t>
-            </a:r>
-            <a:endParaRPr lang="en-US" dirty="0"/>
+            <a:endParaRPr lang="en-US"/>
           </a:p>
         </p:txBody>
       </p:sp>
@@ -2853,7 +2826,7 @@
     </p:spTree>
     <p:extLst>
       <p:ext uri="{BB962C8B-B14F-4D97-AF65-F5344CB8AC3E}">
-        <p14:creationId xmlns:p14="http://schemas.microsoft.com/office/powerpoint/2010/main" val="273409268"/>
+        <p14:creationId xmlns:p14="http://schemas.microsoft.com/office/powerpoint/2010/main" val="2608757023"/>
       </p:ext>
     </p:extLst>
   </p:cSld>
@@ -2867,9 +2840,15 @@
 <p:sldMaster xmlns:a="http://schemas.openxmlformats.org/drawingml/2006/main" xmlns:r="http://schemas.openxmlformats.org/officeDocument/2006/relationships" xmlns:p="http://schemas.openxmlformats.org/presentationml/2006/main">
   <p:cSld>
     <p:bg>
-      <p:bgRef idx="1001">
-        <a:schemeClr val="bg1"/>
-      </p:bgRef>
+      <p:bgPr>
+        <a:solidFill>
+          <a:schemeClr val="accent4">
+            <a:lumMod val="20000"/>
+            <a:lumOff val="80000"/>
+          </a:schemeClr>
+        </a:solidFill>
+        <a:effectLst/>
+      </p:bgPr>
     </p:bg>
     <p:spTree>
       <p:nvGrpSpPr>
@@ -2945,38 +2924,38 @@
           <a:p>
             <a:pPr lvl="0"/>
             <a:r>
-              <a:rPr lang="en-US" dirty="0" smtClean="0"/>
+              <a:rPr lang="en-US" smtClean="0"/>
               <a:t>Edit Master text styles</a:t>
             </a:r>
           </a:p>
           <a:p>
             <a:pPr lvl="1"/>
             <a:r>
-              <a:rPr lang="en-US" dirty="0" smtClean="0"/>
+              <a:rPr lang="en-US" smtClean="0"/>
               <a:t>Second level</a:t>
             </a:r>
           </a:p>
           <a:p>
             <a:pPr lvl="2"/>
             <a:r>
-              <a:rPr lang="en-US" dirty="0" smtClean="0"/>
+              <a:rPr lang="en-US" smtClean="0"/>
               <a:t>Third level</a:t>
             </a:r>
           </a:p>
           <a:p>
             <a:pPr lvl="3"/>
             <a:r>
-              <a:rPr lang="en-US" dirty="0" smtClean="0"/>
+              <a:rPr lang="en-US" smtClean="0"/>
               <a:t>Fourth level</a:t>
             </a:r>
           </a:p>
           <a:p>
             <a:pPr lvl="4"/>
             <a:r>
-              <a:rPr lang="en-US" dirty="0" smtClean="0"/>
+              <a:rPr lang="en-US" smtClean="0"/>
               <a:t>Fifth level</a:t>
             </a:r>
-            <a:endParaRPr lang="en-US" dirty="0"/>
+            <a:endParaRPr lang="en-US"/>
           </a:p>
         </p:txBody>
       </p:sp>
@@ -3005,7 +2984,9 @@
             <a:lvl1pPr algn="l">
               <a:defRPr sz="1200">
                 <a:solidFill>
-                  <a:schemeClr val="accent4"/>
+                  <a:schemeClr val="tx1">
+                    <a:tint val="75000"/>
+                  </a:schemeClr>
                 </a:solidFill>
               </a:defRPr>
             </a:lvl1pPr>
@@ -3045,7 +3026,9 @@
             <a:lvl1pPr algn="ctr">
               <a:defRPr sz="1200">
                 <a:solidFill>
-                  <a:schemeClr val="accent4"/>
+                  <a:schemeClr val="tx1">
+                    <a:tint val="75000"/>
+                  </a:schemeClr>
                 </a:solidFill>
               </a:defRPr>
             </a:lvl1pPr>
@@ -3084,16 +3067,14 @@
             <a:lvl1pPr algn="r">
               <a:defRPr sz="1200">
                 <a:solidFill>
-                  <a:schemeClr val="accent4"/>
+                  <a:schemeClr val="tx1">
+                    <a:tint val="75000"/>
+                  </a:schemeClr>
                 </a:solidFill>
               </a:defRPr>
             </a:lvl1pPr>
           </a:lstStyle>
           <a:p>
-            <a:r>
-              <a:rPr lang="en-US" smtClean="0"/>
-              <a:t>/</a:t>
-            </a:r>
             <a:fld id="{DAAA4506-2605-4298-B94A-EC5D3A4D4A3F}" type="slidenum">
               <a:rPr lang="en-US" smtClean="0"/>
               <a:pPr/>
@@ -3106,31 +3087,24 @@
     </p:spTree>
     <p:extLst>
       <p:ext uri="{BB962C8B-B14F-4D97-AF65-F5344CB8AC3E}">
-        <p14:creationId xmlns:p14="http://schemas.microsoft.com/office/powerpoint/2010/main" val="334780795"/>
+        <p14:creationId xmlns:p14="http://schemas.microsoft.com/office/powerpoint/2010/main" val="1110199881"/>
       </p:ext>
     </p:extLst>
   </p:cSld>
-  <p:clrMap bg1="dk1" tx1="lt1" bg2="dk2" tx2="lt2" accent1="accent1" accent2="accent2" accent3="accent3" accent4="accent4" accent5="accent5" accent6="accent6" hlink="hlink" folHlink="folHlink"/>
+  <p:clrMap bg1="lt1" tx1="dk1" bg2="lt2" tx2="dk2" accent1="accent1" accent2="accent2" accent3="accent3" accent4="accent4" accent5="accent5" accent6="accent6" hlink="hlink" folHlink="folHlink"/>
   <p:sldLayoutIdLst>
-    <p:sldLayoutId id="2147483745" r:id="rId1"/>
-    <p:sldLayoutId id="2147483746" r:id="rId2"/>
-    <p:sldLayoutId id="2147483747" r:id="rId3"/>
-    <p:sldLayoutId id="2147483748" r:id="rId4"/>
-    <p:sldLayoutId id="2147483749" r:id="rId5"/>
-    <p:sldLayoutId id="2147483750" r:id="rId6"/>
-    <p:sldLayoutId id="2147483751" r:id="rId7"/>
-    <p:sldLayoutId id="2147483752" r:id="rId8"/>
-    <p:sldLayoutId id="2147483753" r:id="rId9"/>
-    <p:sldLayoutId id="2147483754" r:id="rId10"/>
-    <p:sldLayoutId id="2147483755" r:id="rId11"/>
+    <p:sldLayoutId id="2147483811" r:id="rId1"/>
+    <p:sldLayoutId id="2147483812" r:id="rId2"/>
+    <p:sldLayoutId id="2147483813" r:id="rId3"/>
+    <p:sldLayoutId id="2147483814" r:id="rId4"/>
+    <p:sldLayoutId id="2147483815" r:id="rId5"/>
+    <p:sldLayoutId id="2147483816" r:id="rId6"/>
+    <p:sldLayoutId id="2147483817" r:id="rId7"/>
+    <p:sldLayoutId id="2147483818" r:id="rId8"/>
+    <p:sldLayoutId id="2147483819" r:id="rId9"/>
+    <p:sldLayoutId id="2147483820" r:id="rId10"/>
+    <p:sldLayoutId id="2147483821" r:id="rId11"/>
   </p:sldLayoutIdLst>
-  <p:timing>
-    <p:tnLst>
-      <p:par>
-        <p:cTn id="1" dur="indefinite" restart="never" nodeType="tmRoot"/>
-      </p:par>
-    </p:tnLst>
-  </p:timing>
   <p:hf hdr="0" dt="0"/>
   <p:txStyles>
     <p:titleStyle>
@@ -3144,7 +3118,7 @@
         <a:buNone/>
         <a:defRPr sz="4400" kern="1200">
           <a:solidFill>
-            <a:schemeClr val="accent4"/>
+            <a:schemeClr val="accent5"/>
           </a:solidFill>
           <a:latin typeface="+mj-lt"/>
           <a:ea typeface="+mj-ea"/>
@@ -3557,11 +3531,11 @@
   <p:clrMapOvr>
     <a:masterClrMapping/>
   </p:clrMapOvr>
-  <mc:AlternateContent xmlns:mc="http://schemas.openxmlformats.org/markup-compatibility/2006">
-    <mc:Choice xmlns:p14="http://schemas.microsoft.com/office/powerpoint/2010/main" Requires="p14">
+  <mc:AlternateContent xmlns:mc="http://schemas.openxmlformats.org/markup-compatibility/2006" xmlns:p14="http://schemas.microsoft.com/office/powerpoint/2010/main">
+    <mc:Choice Requires="p14">
       <p:transition spd="slow" p14:dur="2000"/>
     </mc:Choice>
-    <mc:Fallback>
+    <mc:Fallback xmlns="">
       <p:transition spd="slow"/>
     </mc:Fallback>
   </mc:AlternateContent>
@@ -3820,10 +3794,6 @@
           <a:bodyPr/>
           <a:lstStyle/>
           <a:p>
-            <a:r>
-              <a:rPr lang="en-US" smtClean="0"/>
-              <a:t>/</a:t>
-            </a:r>
             <a:fld id="{DAAA4506-2605-4298-B94A-EC5D3A4D4A3F}" type="slidenum">
               <a:rPr lang="en-US" smtClean="0"/>
               <a:pPr/>
@@ -3843,11 +3813,11 @@
   <p:clrMapOvr>
     <a:masterClrMapping/>
   </p:clrMapOvr>
-  <mc:AlternateContent xmlns:mc="http://schemas.openxmlformats.org/markup-compatibility/2006">
-    <mc:Choice xmlns:p14="http://schemas.microsoft.com/office/powerpoint/2010/main" Requires="p14">
+  <mc:AlternateContent xmlns:mc="http://schemas.openxmlformats.org/markup-compatibility/2006" xmlns:p14="http://schemas.microsoft.com/office/powerpoint/2010/main">
+    <mc:Choice Requires="p14">
       <p:transition spd="slow" p14:dur="2000"/>
     </mc:Choice>
-    <mc:Fallback>
+    <mc:Fallback xmlns="">
       <p:transition spd="slow"/>
     </mc:Fallback>
   </mc:AlternateContent>
@@ -4395,7 +4365,9 @@
         </p:nvSpPr>
         <p:spPr/>
         <p:txBody>
-          <a:bodyPr/>
+          <a:bodyPr>
+            <a:normAutofit/>
+          </a:bodyPr>
           <a:lstStyle/>
           <a:p>
             <a:r>
@@ -4500,10 +4472,6 @@
           <a:bodyPr/>
           <a:lstStyle/>
           <a:p>
-            <a:r>
-              <a:rPr lang="en-US" smtClean="0"/>
-              <a:t>/</a:t>
-            </a:r>
             <a:fld id="{DAAA4506-2605-4298-B94A-EC5D3A4D4A3F}" type="slidenum">
               <a:rPr lang="en-US" smtClean="0"/>
               <a:pPr/>
@@ -4523,11 +4491,11 @@
   <p:clrMapOvr>
     <a:masterClrMapping/>
   </p:clrMapOvr>
-  <mc:AlternateContent xmlns:mc="http://schemas.openxmlformats.org/markup-compatibility/2006">
-    <mc:Choice xmlns:p14="http://schemas.microsoft.com/office/powerpoint/2010/main" Requires="p14">
+  <mc:AlternateContent xmlns:mc="http://schemas.openxmlformats.org/markup-compatibility/2006" xmlns:p14="http://schemas.microsoft.com/office/powerpoint/2010/main">
+    <mc:Choice Requires="p14">
       <p:transition spd="slow" p14:dur="2000"/>
     </mc:Choice>
-    <mc:Fallback>
+    <mc:Fallback xmlns="">
       <p:transition spd="slow"/>
     </mc:Fallback>
   </mc:AlternateContent>
@@ -5128,10 +5096,6 @@
           <a:bodyPr/>
           <a:lstStyle/>
           <a:p>
-            <a:r>
-              <a:rPr lang="en-US" smtClean="0"/>
-              <a:t>/</a:t>
-            </a:r>
             <a:fld id="{DAAA4506-2605-4298-B94A-EC5D3A4D4A3F}" type="slidenum">
               <a:rPr lang="en-US" smtClean="0"/>
               <a:pPr/>
@@ -5151,11 +5115,11 @@
   <p:clrMapOvr>
     <a:masterClrMapping/>
   </p:clrMapOvr>
-  <mc:AlternateContent xmlns:mc="http://schemas.openxmlformats.org/markup-compatibility/2006">
-    <mc:Choice xmlns:p14="http://schemas.microsoft.com/office/powerpoint/2010/main" Requires="p14">
+  <mc:AlternateContent xmlns:mc="http://schemas.openxmlformats.org/markup-compatibility/2006" xmlns:p14="http://schemas.microsoft.com/office/powerpoint/2010/main">
+    <mc:Choice Requires="p14">
       <p:transition spd="slow" p14:dur="2000"/>
     </mc:Choice>
-    <mc:Fallback>
+    <mc:Fallback xmlns="">
       <p:transition spd="slow"/>
     </mc:Fallback>
   </mc:AlternateContent>
@@ -5737,7 +5701,7 @@
         <p:spPr/>
         <p:txBody>
           <a:bodyPr>
-            <a:normAutofit fontScale="92500"/>
+            <a:normAutofit/>
           </a:bodyPr>
           <a:lstStyle/>
           <a:p>
@@ -5843,10 +5807,6 @@
           <a:bodyPr/>
           <a:lstStyle/>
           <a:p>
-            <a:r>
-              <a:rPr lang="en-US" smtClean="0"/>
-              <a:t>/</a:t>
-            </a:r>
             <a:fld id="{DAAA4506-2605-4298-B94A-EC5D3A4D4A3F}" type="slidenum">
               <a:rPr lang="en-US" smtClean="0"/>
               <a:pPr/>
@@ -5866,11 +5826,11 @@
   <p:clrMapOvr>
     <a:masterClrMapping/>
   </p:clrMapOvr>
-  <mc:AlternateContent xmlns:mc="http://schemas.openxmlformats.org/markup-compatibility/2006">
-    <mc:Choice xmlns:p14="http://schemas.microsoft.com/office/powerpoint/2010/main" Requires="p14">
+  <mc:AlternateContent xmlns:mc="http://schemas.openxmlformats.org/markup-compatibility/2006" xmlns:p14="http://schemas.microsoft.com/office/powerpoint/2010/main">
+    <mc:Choice Requires="p14">
       <p:transition spd="slow" p14:dur="2000"/>
     </mc:Choice>
-    <mc:Fallback>
+    <mc:Fallback xmlns="">
       <p:transition spd="slow"/>
     </mc:Fallback>
   </mc:AlternateContent>
@@ -6507,10 +6467,6 @@
           <a:bodyPr/>
           <a:lstStyle/>
           <a:p>
-            <a:r>
-              <a:rPr lang="en-US" smtClean="0"/>
-              <a:t>/</a:t>
-            </a:r>
             <a:fld id="{DAAA4506-2605-4298-B94A-EC5D3A4D4A3F}" type="slidenum">
               <a:rPr lang="en-US" smtClean="0"/>
               <a:pPr/>
@@ -6530,11 +6486,11 @@
   <p:clrMapOvr>
     <a:masterClrMapping/>
   </p:clrMapOvr>
-  <mc:AlternateContent xmlns:mc="http://schemas.openxmlformats.org/markup-compatibility/2006">
-    <mc:Choice xmlns:p14="http://schemas.microsoft.com/office/powerpoint/2010/main" Requires="p14">
+  <mc:AlternateContent xmlns:mc="http://schemas.openxmlformats.org/markup-compatibility/2006" xmlns:p14="http://schemas.microsoft.com/office/powerpoint/2010/main">
+    <mc:Choice Requires="p14">
       <p:transition spd="slow" p14:dur="2000"/>
     </mc:Choice>
-    <mc:Fallback>
+    <mc:Fallback xmlns="">
       <p:transition spd="slow"/>
     </mc:Fallback>
   </mc:AlternateContent>
@@ -6969,7 +6925,9 @@
         </p:nvSpPr>
         <p:spPr/>
         <p:txBody>
-          <a:bodyPr/>
+          <a:bodyPr>
+            <a:normAutofit/>
+          </a:bodyPr>
           <a:lstStyle/>
           <a:p>
             <a:r>
@@ -7111,10 +7069,6 @@
           <a:bodyPr/>
           <a:lstStyle/>
           <a:p>
-            <a:r>
-              <a:rPr lang="en-US" smtClean="0"/>
-              <a:t>/</a:t>
-            </a:r>
             <a:fld id="{DAAA4506-2605-4298-B94A-EC5D3A4D4A3F}" type="slidenum">
               <a:rPr lang="en-US" smtClean="0"/>
               <a:pPr/>
@@ -7134,11 +7088,11 @@
   <p:clrMapOvr>
     <a:masterClrMapping/>
   </p:clrMapOvr>
-  <mc:AlternateContent xmlns:mc="http://schemas.openxmlformats.org/markup-compatibility/2006">
-    <mc:Choice xmlns:p14="http://schemas.microsoft.com/office/powerpoint/2010/main" Requires="p14">
+  <mc:AlternateContent xmlns:mc="http://schemas.openxmlformats.org/markup-compatibility/2006" xmlns:p14="http://schemas.microsoft.com/office/powerpoint/2010/main">
+    <mc:Choice Requires="p14">
       <p:transition spd="slow" p14:dur="2000"/>
     </mc:Choice>
-    <mc:Fallback>
+    <mc:Fallback xmlns="">
       <p:transition spd="slow"/>
     </mc:Fallback>
   </mc:AlternateContent>
@@ -7691,7 +7645,7 @@
         <p:spPr/>
         <p:txBody>
           <a:bodyPr>
-            <a:normAutofit lnSpcReduction="10000"/>
+            <a:normAutofit/>
           </a:bodyPr>
           <a:lstStyle/>
           <a:p>
@@ -7810,10 +7764,6 @@
           <a:bodyPr/>
           <a:lstStyle/>
           <a:p>
-            <a:r>
-              <a:rPr lang="en-US" smtClean="0"/>
-              <a:t>/</a:t>
-            </a:r>
             <a:fld id="{DAAA4506-2605-4298-B94A-EC5D3A4D4A3F}" type="slidenum">
               <a:rPr lang="en-US" smtClean="0"/>
               <a:pPr/>
@@ -7833,11 +7783,11 @@
   <p:clrMapOvr>
     <a:masterClrMapping/>
   </p:clrMapOvr>
-  <mc:AlternateContent xmlns:mc="http://schemas.openxmlformats.org/markup-compatibility/2006">
-    <mc:Choice xmlns:p14="http://schemas.microsoft.com/office/powerpoint/2010/main" Requires="p14">
+  <mc:AlternateContent xmlns:mc="http://schemas.openxmlformats.org/markup-compatibility/2006" xmlns:p14="http://schemas.microsoft.com/office/powerpoint/2010/main">
+    <mc:Choice Requires="p14">
       <p:transition spd="slow" p14:dur="2000"/>
     </mc:Choice>
-    <mc:Fallback>
+    <mc:Fallback xmlns="">
       <p:transition spd="slow"/>
     </mc:Fallback>
   </mc:AlternateContent>
@@ -8494,10 +8444,6 @@
           <a:bodyPr/>
           <a:lstStyle/>
           <a:p>
-            <a:r>
-              <a:rPr lang="en-US" smtClean="0"/>
-              <a:t>/</a:t>
-            </a:r>
             <a:fld id="{DAAA4506-2605-4298-B94A-EC5D3A4D4A3F}" type="slidenum">
               <a:rPr lang="en-US" smtClean="0"/>
               <a:pPr/>
@@ -8517,11 +8463,11 @@
   <p:clrMapOvr>
     <a:masterClrMapping/>
   </p:clrMapOvr>
-  <mc:AlternateContent xmlns:mc="http://schemas.openxmlformats.org/markup-compatibility/2006">
-    <mc:Choice xmlns:p14="http://schemas.microsoft.com/office/powerpoint/2010/main" Requires="p14">
+  <mc:AlternateContent xmlns:mc="http://schemas.openxmlformats.org/markup-compatibility/2006" xmlns:p14="http://schemas.microsoft.com/office/powerpoint/2010/main">
+    <mc:Choice Requires="p14">
       <p:transition spd="slow" p14:dur="2000"/>
     </mc:Choice>
-    <mc:Fallback>
+    <mc:Fallback xmlns="">
       <p:transition spd="slow"/>
     </mc:Fallback>
   </mc:AlternateContent>
@@ -9088,10 +9034,6 @@
           <a:bodyPr/>
           <a:lstStyle/>
           <a:p>
-            <a:r>
-              <a:rPr lang="en-US" smtClean="0"/>
-              <a:t>/</a:t>
-            </a:r>
             <a:fld id="{DAAA4506-2605-4298-B94A-EC5D3A4D4A3F}" type="slidenum">
               <a:rPr lang="en-US" smtClean="0"/>
               <a:pPr/>
@@ -9111,11 +9053,11 @@
   <p:clrMapOvr>
     <a:masterClrMapping/>
   </p:clrMapOvr>
-  <mc:AlternateContent xmlns:mc="http://schemas.openxmlformats.org/markup-compatibility/2006">
-    <mc:Choice xmlns:p14="http://schemas.microsoft.com/office/powerpoint/2010/main" Requires="p14">
+  <mc:AlternateContent xmlns:mc="http://schemas.openxmlformats.org/markup-compatibility/2006" xmlns:p14="http://schemas.microsoft.com/office/powerpoint/2010/main">
+    <mc:Choice Requires="p14">
       <p:transition spd="slow" p14:dur="2000"/>
     </mc:Choice>
-    <mc:Fallback>
+    <mc:Fallback xmlns="">
       <p:transition spd="slow"/>
     </mc:Fallback>
   </mc:AlternateContent>
@@ -9306,10 +9248,6 @@
           <a:bodyPr/>
           <a:lstStyle/>
           <a:p>
-            <a:r>
-              <a:rPr lang="en-US" smtClean="0"/>
-              <a:t>/</a:t>
-            </a:r>
             <a:fld id="{DAAA4506-2605-4298-B94A-EC5D3A4D4A3F}" type="slidenum">
               <a:rPr lang="en-US" smtClean="0"/>
               <a:pPr/>
@@ -9329,11 +9267,11 @@
   <p:clrMapOvr>
     <a:masterClrMapping/>
   </p:clrMapOvr>
-  <mc:AlternateContent xmlns:mc="http://schemas.openxmlformats.org/markup-compatibility/2006">
-    <mc:Choice xmlns:p14="http://schemas.microsoft.com/office/powerpoint/2010/main" Requires="p14">
+  <mc:AlternateContent xmlns:mc="http://schemas.openxmlformats.org/markup-compatibility/2006" xmlns:p14="http://schemas.microsoft.com/office/powerpoint/2010/main">
+    <mc:Choice Requires="p14">
       <p:transition spd="slow" p14:dur="2000"/>
     </mc:Choice>
-    <mc:Fallback>
+    <mc:Fallback xmlns="">
       <p:transition spd="slow"/>
     </mc:Fallback>
   </mc:AlternateContent>
@@ -9925,11 +9863,11 @@
   <p:clrMapOvr>
     <a:masterClrMapping/>
   </p:clrMapOvr>
-  <mc:AlternateContent xmlns:mc="http://schemas.openxmlformats.org/markup-compatibility/2006">
-    <mc:Choice xmlns:p14="http://schemas.microsoft.com/office/powerpoint/2010/main" Requires="p14">
+  <mc:AlternateContent xmlns:mc="http://schemas.openxmlformats.org/markup-compatibility/2006" xmlns:p14="http://schemas.microsoft.com/office/powerpoint/2010/main">
+    <mc:Choice Requires="p14">
       <p:transition spd="slow" p14:dur="2000"/>
     </mc:Choice>
-    <mc:Fallback>
+    <mc:Fallback xmlns="">
       <p:transition spd="slow"/>
     </mc:Fallback>
   </mc:AlternateContent>
@@ -9939,6 +9877,1962 @@
         <p:cTn id="1" dur="indefinite" restart="never" nodeType="tmRoot"/>
       </p:par>
     </p:tnLst>
+  </p:timing>
+</p:sld>
+</file>
+
+<file path=ppt/slides/slide20.xml><?xml version="1.0" encoding="utf-8"?>
+<p:sld xmlns:a="http://schemas.openxmlformats.org/drawingml/2006/main" xmlns:r="http://schemas.openxmlformats.org/officeDocument/2006/relationships" xmlns:p="http://schemas.openxmlformats.org/presentationml/2006/main">
+  <p:cSld>
+    <p:spTree>
+      <p:nvGrpSpPr>
+        <p:cNvPr id="1" name=""/>
+        <p:cNvGrpSpPr/>
+        <p:nvPr/>
+      </p:nvGrpSpPr>
+      <p:grpSpPr>
+        <a:xfrm>
+          <a:off x="0" y="0"/>
+          <a:ext cx="0" cy="0"/>
+          <a:chOff x="0" y="0"/>
+          <a:chExt cx="0" cy="0"/>
+        </a:xfrm>
+      </p:grpSpPr>
+      <p:sp>
+        <p:nvSpPr>
+          <p:cNvPr id="2" name="Title 1"/>
+          <p:cNvSpPr>
+            <a:spLocks noGrp="1"/>
+          </p:cNvSpPr>
+          <p:nvPr>
+            <p:ph type="title"/>
+          </p:nvPr>
+        </p:nvSpPr>
+        <p:spPr/>
+        <p:txBody>
+          <a:bodyPr/>
+          <a:lstStyle/>
+          <a:p>
+            <a:r>
+              <a:rPr lang="en-US" dirty="0"/>
+              <a:t>21-3. Lect. </a:t>
+            </a:r>
+            <a:r>
+              <a:rPr lang="en-US" dirty="0" smtClean="0"/>
+              <a:t>16 – Unit Testing</a:t>
+            </a:r>
+            <a:endParaRPr lang="en-US" dirty="0"/>
+          </a:p>
+        </p:txBody>
+      </p:sp>
+      <p:sp>
+        <p:nvSpPr>
+          <p:cNvPr id="3" name="Content Placeholder 2"/>
+          <p:cNvSpPr>
+            <a:spLocks noGrp="1"/>
+          </p:cNvSpPr>
+          <p:nvPr>
+            <p:ph idx="1"/>
+          </p:nvPr>
+        </p:nvSpPr>
+        <p:spPr/>
+        <p:txBody>
+          <a:bodyPr>
+            <a:normAutofit/>
+          </a:bodyPr>
+          <a:lstStyle/>
+          <a:p>
+            <a:r>
+              <a:rPr lang="en-US" dirty="0" smtClean="0"/>
+              <a:t>For unit testing, need to test all paths (not just "happy" paths)</a:t>
+            </a:r>
+          </a:p>
+          <a:p>
+            <a:r>
+              <a:rPr lang="en-US" dirty="0" smtClean="0"/>
+              <a:t>Unit testing tests a single subroutine / procedure /method</a:t>
+            </a:r>
+          </a:p>
+          <a:p>
+            <a:pPr lvl="1"/>
+            <a:r>
+              <a:rPr lang="en-US" dirty="0" smtClean="0"/>
+              <a:t>unit = "code module"</a:t>
+            </a:r>
+          </a:p>
+          <a:p>
+            <a:r>
+              <a:rPr lang="en-US" dirty="0" smtClean="0"/>
+              <a:t>Best way to catch boundary-based bugs</a:t>
+            </a:r>
+          </a:p>
+          <a:p>
+            <a:r>
+              <a:rPr lang="en-US" dirty="0" smtClean="0"/>
+              <a:t>Use both white &amp; black box testing</a:t>
+            </a:r>
+            <a:endParaRPr lang="en-US" dirty="0" smtClean="0"/>
+          </a:p>
+          <a:p>
+            <a:r>
+              <a:rPr lang="en-US" dirty="0" smtClean="0"/>
+              <a:t>Coverage is a metric for how thorough testing is</a:t>
+            </a:r>
+          </a:p>
+          <a:p>
+            <a:r>
+              <a:rPr lang="en-US" dirty="0" smtClean="0"/>
+              <a:t>Unit Test Coverage strategies: boundary tests &amp; exceptional values, (NULL, </a:t>
+            </a:r>
+            <a:r>
+              <a:rPr lang="en-US" dirty="0" err="1" smtClean="0"/>
+              <a:t>NaN</a:t>
+            </a:r>
+            <a:r>
+              <a:rPr lang="en-US" dirty="0" smtClean="0"/>
+              <a:t>, </a:t>
+            </a:r>
+            <a:r>
+              <a:rPr lang="en-US" dirty="0" err="1" smtClean="0"/>
+              <a:t>etc</a:t>
+            </a:r>
+            <a:r>
+              <a:rPr lang="en-US" dirty="0" smtClean="0"/>
+              <a:t>)</a:t>
+            </a:r>
+            <a:endParaRPr lang="en-US" dirty="0" smtClean="0"/>
+          </a:p>
+        </p:txBody>
+      </p:sp>
+      <p:sp>
+        <p:nvSpPr>
+          <p:cNvPr id="4" name="Footer Placeholder 3"/>
+          <p:cNvSpPr>
+            <a:spLocks noGrp="1"/>
+          </p:cNvSpPr>
+          <p:nvPr>
+            <p:ph type="ftr" sz="quarter" idx="11"/>
+          </p:nvPr>
+        </p:nvSpPr>
+        <p:spPr/>
+        <p:txBody>
+          <a:bodyPr/>
+          <a:lstStyle/>
+          <a:p>
+            <a:r>
+              <a:rPr lang="en-US" smtClean="0"/>
+              <a:t>NGUYEN_Todd_noid</a:t>
+            </a:r>
+            <a:endParaRPr lang="en-US"/>
+          </a:p>
+        </p:txBody>
+      </p:sp>
+      <p:sp>
+        <p:nvSpPr>
+          <p:cNvPr id="5" name="Slide Number Placeholder 4"/>
+          <p:cNvSpPr>
+            <a:spLocks noGrp="1"/>
+          </p:cNvSpPr>
+          <p:nvPr>
+            <p:ph type="sldNum" sz="quarter" idx="12"/>
+          </p:nvPr>
+        </p:nvSpPr>
+        <p:spPr/>
+        <p:txBody>
+          <a:bodyPr/>
+          <a:lstStyle/>
+          <a:p>
+            <a:fld id="{DAAA4506-2605-4298-B94A-EC5D3A4D4A3F}" type="slidenum">
+              <a:rPr lang="en-US" smtClean="0"/>
+              <a:pPr/>
+              <a:t>20</a:t>
+            </a:fld>
+            <a:endParaRPr lang="en-US" dirty="0"/>
+          </a:p>
+        </p:txBody>
+      </p:sp>
+    </p:spTree>
+    <p:extLst>
+      <p:ext uri="{BB962C8B-B14F-4D97-AF65-F5344CB8AC3E}">
+        <p14:creationId xmlns:p14="http://schemas.microsoft.com/office/powerpoint/2010/main" val="565963669"/>
+      </p:ext>
+    </p:extLst>
+  </p:cSld>
+  <p:clrMapOvr>
+    <a:masterClrMapping/>
+  </p:clrMapOvr>
+  <mc:AlternateContent xmlns:mc="http://schemas.openxmlformats.org/markup-compatibility/2006" xmlns:p14="http://schemas.microsoft.com/office/powerpoint/2010/main">
+    <mc:Choice Requires="p14">
+      <p:transition spd="slow" p14:dur="2000"/>
+    </mc:Choice>
+    <mc:Fallback xmlns="">
+      <p:transition spd="slow"/>
+    </mc:Fallback>
+  </mc:AlternateContent>
+  <p:timing>
+    <p:tnLst>
+      <p:par>
+        <p:cTn id="1" dur="indefinite" restart="never" nodeType="tmRoot">
+          <p:childTnLst>
+            <p:seq concurrent="1" nextAc="seek">
+              <p:cTn id="2" dur="indefinite" nodeType="mainSeq">
+                <p:childTnLst>
+                  <p:par>
+                    <p:cTn id="3" fill="hold">
+                      <p:stCondLst>
+                        <p:cond delay="indefinite"/>
+                      </p:stCondLst>
+                      <p:childTnLst>
+                        <p:par>
+                          <p:cTn id="4" fill="hold">
+                            <p:stCondLst>
+                              <p:cond delay="0"/>
+                            </p:stCondLst>
+                            <p:childTnLst>
+                              <p:par>
+                                <p:cTn id="5" presetID="10" presetClass="entr" presetSubtype="0" fill="hold" grpId="0" nodeType="clickEffect">
+                                  <p:stCondLst>
+                                    <p:cond delay="0"/>
+                                  </p:stCondLst>
+                                  <p:childTnLst>
+                                    <p:set>
+                                      <p:cBhvr>
+                                        <p:cTn id="6" dur="1" fill="hold">
+                                          <p:stCondLst>
+                                            <p:cond delay="0"/>
+                                          </p:stCondLst>
+                                        </p:cTn>
+                                        <p:tgtEl>
+                                          <p:spTgt spid="3">
+                                            <p:txEl>
+                                              <p:pRg st="0" end="0"/>
+                                            </p:txEl>
+                                          </p:spTgt>
+                                        </p:tgtEl>
+                                        <p:attrNameLst>
+                                          <p:attrName>style.visibility</p:attrName>
+                                        </p:attrNameLst>
+                                      </p:cBhvr>
+                                      <p:to>
+                                        <p:strVal val="visible"/>
+                                      </p:to>
+                                    </p:set>
+                                    <p:animEffect transition="in" filter="fade">
+                                      <p:cBhvr>
+                                        <p:cTn id="7" dur="500"/>
+                                        <p:tgtEl>
+                                          <p:spTgt spid="3">
+                                            <p:txEl>
+                                              <p:pRg st="0" end="0"/>
+                                            </p:txEl>
+                                          </p:spTgt>
+                                        </p:tgtEl>
+                                      </p:cBhvr>
+                                    </p:animEffect>
+                                  </p:childTnLst>
+                                </p:cTn>
+                              </p:par>
+                            </p:childTnLst>
+                          </p:cTn>
+                        </p:par>
+                      </p:childTnLst>
+                    </p:cTn>
+                  </p:par>
+                  <p:par>
+                    <p:cTn id="8" fill="hold">
+                      <p:stCondLst>
+                        <p:cond delay="indefinite"/>
+                      </p:stCondLst>
+                      <p:childTnLst>
+                        <p:par>
+                          <p:cTn id="9" fill="hold">
+                            <p:stCondLst>
+                              <p:cond delay="0"/>
+                            </p:stCondLst>
+                            <p:childTnLst>
+                              <p:par>
+                                <p:cTn id="10" presetID="10" presetClass="entr" presetSubtype="0" fill="hold" grpId="0" nodeType="clickEffect">
+                                  <p:stCondLst>
+                                    <p:cond delay="0"/>
+                                  </p:stCondLst>
+                                  <p:childTnLst>
+                                    <p:set>
+                                      <p:cBhvr>
+                                        <p:cTn id="11" dur="1" fill="hold">
+                                          <p:stCondLst>
+                                            <p:cond delay="0"/>
+                                          </p:stCondLst>
+                                        </p:cTn>
+                                        <p:tgtEl>
+                                          <p:spTgt spid="3">
+                                            <p:txEl>
+                                              <p:pRg st="1" end="1"/>
+                                            </p:txEl>
+                                          </p:spTgt>
+                                        </p:tgtEl>
+                                        <p:attrNameLst>
+                                          <p:attrName>style.visibility</p:attrName>
+                                        </p:attrNameLst>
+                                      </p:cBhvr>
+                                      <p:to>
+                                        <p:strVal val="visible"/>
+                                      </p:to>
+                                    </p:set>
+                                    <p:animEffect transition="in" filter="fade">
+                                      <p:cBhvr>
+                                        <p:cTn id="12" dur="500"/>
+                                        <p:tgtEl>
+                                          <p:spTgt spid="3">
+                                            <p:txEl>
+                                              <p:pRg st="1" end="1"/>
+                                            </p:txEl>
+                                          </p:spTgt>
+                                        </p:tgtEl>
+                                      </p:cBhvr>
+                                    </p:animEffect>
+                                  </p:childTnLst>
+                                </p:cTn>
+                              </p:par>
+                              <p:par>
+                                <p:cTn id="13" presetID="10" presetClass="entr" presetSubtype="0" fill="hold" grpId="0" nodeType="withEffect">
+                                  <p:stCondLst>
+                                    <p:cond delay="0"/>
+                                  </p:stCondLst>
+                                  <p:childTnLst>
+                                    <p:set>
+                                      <p:cBhvr>
+                                        <p:cTn id="14" dur="1" fill="hold">
+                                          <p:stCondLst>
+                                            <p:cond delay="0"/>
+                                          </p:stCondLst>
+                                        </p:cTn>
+                                        <p:tgtEl>
+                                          <p:spTgt spid="3">
+                                            <p:txEl>
+                                              <p:pRg st="2" end="2"/>
+                                            </p:txEl>
+                                          </p:spTgt>
+                                        </p:tgtEl>
+                                        <p:attrNameLst>
+                                          <p:attrName>style.visibility</p:attrName>
+                                        </p:attrNameLst>
+                                      </p:cBhvr>
+                                      <p:to>
+                                        <p:strVal val="visible"/>
+                                      </p:to>
+                                    </p:set>
+                                    <p:animEffect transition="in" filter="fade">
+                                      <p:cBhvr>
+                                        <p:cTn id="15" dur="500"/>
+                                        <p:tgtEl>
+                                          <p:spTgt spid="3">
+                                            <p:txEl>
+                                              <p:pRg st="2" end="2"/>
+                                            </p:txEl>
+                                          </p:spTgt>
+                                        </p:tgtEl>
+                                      </p:cBhvr>
+                                    </p:animEffect>
+                                  </p:childTnLst>
+                                </p:cTn>
+                              </p:par>
+                            </p:childTnLst>
+                          </p:cTn>
+                        </p:par>
+                      </p:childTnLst>
+                    </p:cTn>
+                  </p:par>
+                  <p:par>
+                    <p:cTn id="16" fill="hold">
+                      <p:stCondLst>
+                        <p:cond delay="indefinite"/>
+                      </p:stCondLst>
+                      <p:childTnLst>
+                        <p:par>
+                          <p:cTn id="17" fill="hold">
+                            <p:stCondLst>
+                              <p:cond delay="0"/>
+                            </p:stCondLst>
+                            <p:childTnLst>
+                              <p:par>
+                                <p:cTn id="18" presetID="10" presetClass="entr" presetSubtype="0" fill="hold" grpId="0" nodeType="clickEffect">
+                                  <p:stCondLst>
+                                    <p:cond delay="0"/>
+                                  </p:stCondLst>
+                                  <p:childTnLst>
+                                    <p:set>
+                                      <p:cBhvr>
+                                        <p:cTn id="19" dur="1" fill="hold">
+                                          <p:stCondLst>
+                                            <p:cond delay="0"/>
+                                          </p:stCondLst>
+                                        </p:cTn>
+                                        <p:tgtEl>
+                                          <p:spTgt spid="3">
+                                            <p:txEl>
+                                              <p:pRg st="3" end="3"/>
+                                            </p:txEl>
+                                          </p:spTgt>
+                                        </p:tgtEl>
+                                        <p:attrNameLst>
+                                          <p:attrName>style.visibility</p:attrName>
+                                        </p:attrNameLst>
+                                      </p:cBhvr>
+                                      <p:to>
+                                        <p:strVal val="visible"/>
+                                      </p:to>
+                                    </p:set>
+                                    <p:animEffect transition="in" filter="fade">
+                                      <p:cBhvr>
+                                        <p:cTn id="20" dur="500"/>
+                                        <p:tgtEl>
+                                          <p:spTgt spid="3">
+                                            <p:txEl>
+                                              <p:pRg st="3" end="3"/>
+                                            </p:txEl>
+                                          </p:spTgt>
+                                        </p:tgtEl>
+                                      </p:cBhvr>
+                                    </p:animEffect>
+                                  </p:childTnLst>
+                                </p:cTn>
+                              </p:par>
+                            </p:childTnLst>
+                          </p:cTn>
+                        </p:par>
+                      </p:childTnLst>
+                    </p:cTn>
+                  </p:par>
+                  <p:par>
+                    <p:cTn id="21" fill="hold">
+                      <p:stCondLst>
+                        <p:cond delay="indefinite"/>
+                      </p:stCondLst>
+                      <p:childTnLst>
+                        <p:par>
+                          <p:cTn id="22" fill="hold">
+                            <p:stCondLst>
+                              <p:cond delay="0"/>
+                            </p:stCondLst>
+                            <p:childTnLst>
+                              <p:par>
+                                <p:cTn id="23" presetID="10" presetClass="entr" presetSubtype="0" fill="hold" grpId="0" nodeType="clickEffect">
+                                  <p:stCondLst>
+                                    <p:cond delay="0"/>
+                                  </p:stCondLst>
+                                  <p:childTnLst>
+                                    <p:set>
+                                      <p:cBhvr>
+                                        <p:cTn id="24" dur="1" fill="hold">
+                                          <p:stCondLst>
+                                            <p:cond delay="0"/>
+                                          </p:stCondLst>
+                                        </p:cTn>
+                                        <p:tgtEl>
+                                          <p:spTgt spid="3">
+                                            <p:txEl>
+                                              <p:pRg st="4" end="4"/>
+                                            </p:txEl>
+                                          </p:spTgt>
+                                        </p:tgtEl>
+                                        <p:attrNameLst>
+                                          <p:attrName>style.visibility</p:attrName>
+                                        </p:attrNameLst>
+                                      </p:cBhvr>
+                                      <p:to>
+                                        <p:strVal val="visible"/>
+                                      </p:to>
+                                    </p:set>
+                                    <p:animEffect transition="in" filter="fade">
+                                      <p:cBhvr>
+                                        <p:cTn id="25" dur="500"/>
+                                        <p:tgtEl>
+                                          <p:spTgt spid="3">
+                                            <p:txEl>
+                                              <p:pRg st="4" end="4"/>
+                                            </p:txEl>
+                                          </p:spTgt>
+                                        </p:tgtEl>
+                                      </p:cBhvr>
+                                    </p:animEffect>
+                                  </p:childTnLst>
+                                </p:cTn>
+                              </p:par>
+                            </p:childTnLst>
+                          </p:cTn>
+                        </p:par>
+                      </p:childTnLst>
+                    </p:cTn>
+                  </p:par>
+                  <p:par>
+                    <p:cTn id="26" fill="hold">
+                      <p:stCondLst>
+                        <p:cond delay="indefinite"/>
+                      </p:stCondLst>
+                      <p:childTnLst>
+                        <p:par>
+                          <p:cTn id="27" fill="hold">
+                            <p:stCondLst>
+                              <p:cond delay="0"/>
+                            </p:stCondLst>
+                            <p:childTnLst>
+                              <p:par>
+                                <p:cTn id="28" presetID="10" presetClass="entr" presetSubtype="0" fill="hold" grpId="0" nodeType="clickEffect">
+                                  <p:stCondLst>
+                                    <p:cond delay="0"/>
+                                  </p:stCondLst>
+                                  <p:childTnLst>
+                                    <p:set>
+                                      <p:cBhvr>
+                                        <p:cTn id="29" dur="1" fill="hold">
+                                          <p:stCondLst>
+                                            <p:cond delay="0"/>
+                                          </p:stCondLst>
+                                        </p:cTn>
+                                        <p:tgtEl>
+                                          <p:spTgt spid="3">
+                                            <p:txEl>
+                                              <p:pRg st="5" end="5"/>
+                                            </p:txEl>
+                                          </p:spTgt>
+                                        </p:tgtEl>
+                                        <p:attrNameLst>
+                                          <p:attrName>style.visibility</p:attrName>
+                                        </p:attrNameLst>
+                                      </p:cBhvr>
+                                      <p:to>
+                                        <p:strVal val="visible"/>
+                                      </p:to>
+                                    </p:set>
+                                    <p:animEffect transition="in" filter="fade">
+                                      <p:cBhvr>
+                                        <p:cTn id="30" dur="500"/>
+                                        <p:tgtEl>
+                                          <p:spTgt spid="3">
+                                            <p:txEl>
+                                              <p:pRg st="5" end="5"/>
+                                            </p:txEl>
+                                          </p:spTgt>
+                                        </p:tgtEl>
+                                      </p:cBhvr>
+                                    </p:animEffect>
+                                  </p:childTnLst>
+                                </p:cTn>
+                              </p:par>
+                            </p:childTnLst>
+                          </p:cTn>
+                        </p:par>
+                      </p:childTnLst>
+                    </p:cTn>
+                  </p:par>
+                  <p:par>
+                    <p:cTn id="31" fill="hold">
+                      <p:stCondLst>
+                        <p:cond delay="indefinite"/>
+                      </p:stCondLst>
+                      <p:childTnLst>
+                        <p:par>
+                          <p:cTn id="32" fill="hold">
+                            <p:stCondLst>
+                              <p:cond delay="0"/>
+                            </p:stCondLst>
+                            <p:childTnLst>
+                              <p:par>
+                                <p:cTn id="33" presetID="10" presetClass="entr" presetSubtype="0" fill="hold" grpId="0" nodeType="clickEffect">
+                                  <p:stCondLst>
+                                    <p:cond delay="0"/>
+                                  </p:stCondLst>
+                                  <p:childTnLst>
+                                    <p:set>
+                                      <p:cBhvr>
+                                        <p:cTn id="34" dur="1" fill="hold">
+                                          <p:stCondLst>
+                                            <p:cond delay="0"/>
+                                          </p:stCondLst>
+                                        </p:cTn>
+                                        <p:tgtEl>
+                                          <p:spTgt spid="3">
+                                            <p:txEl>
+                                              <p:pRg st="6" end="6"/>
+                                            </p:txEl>
+                                          </p:spTgt>
+                                        </p:tgtEl>
+                                        <p:attrNameLst>
+                                          <p:attrName>style.visibility</p:attrName>
+                                        </p:attrNameLst>
+                                      </p:cBhvr>
+                                      <p:to>
+                                        <p:strVal val="visible"/>
+                                      </p:to>
+                                    </p:set>
+                                    <p:animEffect transition="in" filter="fade">
+                                      <p:cBhvr>
+                                        <p:cTn id="35" dur="500"/>
+                                        <p:tgtEl>
+                                          <p:spTgt spid="3">
+                                            <p:txEl>
+                                              <p:pRg st="6" end="6"/>
+                                            </p:txEl>
+                                          </p:spTgt>
+                                        </p:tgtEl>
+                                      </p:cBhvr>
+                                    </p:animEffect>
+                                  </p:childTnLst>
+                                </p:cTn>
+                              </p:par>
+                            </p:childTnLst>
+                          </p:cTn>
+                        </p:par>
+                      </p:childTnLst>
+                    </p:cTn>
+                  </p:par>
+                </p:childTnLst>
+              </p:cTn>
+              <p:prevCondLst>
+                <p:cond evt="onPrev" delay="0">
+                  <p:tgtEl>
+                    <p:sldTgt/>
+                  </p:tgtEl>
+                </p:cond>
+              </p:prevCondLst>
+              <p:nextCondLst>
+                <p:cond evt="onNext" delay="0">
+                  <p:tgtEl>
+                    <p:sldTgt/>
+                  </p:tgtEl>
+                </p:cond>
+              </p:nextCondLst>
+            </p:seq>
+          </p:childTnLst>
+        </p:cTn>
+      </p:par>
+    </p:tnLst>
+    <p:bldLst>
+      <p:bldP spid="3" grpId="0" build="p"/>
+    </p:bldLst>
+  </p:timing>
+</p:sld>
+</file>
+
+<file path=ppt/slides/slide21.xml><?xml version="1.0" encoding="utf-8"?>
+<p:sld xmlns:a="http://schemas.openxmlformats.org/drawingml/2006/main" xmlns:r="http://schemas.openxmlformats.org/officeDocument/2006/relationships" xmlns:p="http://schemas.openxmlformats.org/presentationml/2006/main">
+  <p:cSld>
+    <p:spTree>
+      <p:nvGrpSpPr>
+        <p:cNvPr id="1" name=""/>
+        <p:cNvGrpSpPr/>
+        <p:nvPr/>
+      </p:nvGrpSpPr>
+      <p:grpSpPr>
+        <a:xfrm>
+          <a:off x="0" y="0"/>
+          <a:ext cx="0" cy="0"/>
+          <a:chOff x="0" y="0"/>
+          <a:chExt cx="0" cy="0"/>
+        </a:xfrm>
+      </p:grpSpPr>
+      <p:sp>
+        <p:nvSpPr>
+          <p:cNvPr id="2" name="Title 1"/>
+          <p:cNvSpPr>
+            <a:spLocks noGrp="1"/>
+          </p:cNvSpPr>
+          <p:nvPr>
+            <p:ph type="title"/>
+          </p:nvPr>
+        </p:nvSpPr>
+        <p:spPr/>
+        <p:txBody>
+          <a:bodyPr/>
+          <a:lstStyle/>
+          <a:p>
+            <a:r>
+              <a:rPr lang="en-US" dirty="0"/>
+              <a:t>21-3. Lect. </a:t>
+            </a:r>
+            <a:r>
+              <a:rPr lang="en-US" dirty="0" smtClean="0"/>
+              <a:t>17 – Integration Testing</a:t>
+            </a:r>
+            <a:endParaRPr lang="en-US" dirty="0"/>
+          </a:p>
+        </p:txBody>
+      </p:sp>
+      <p:sp>
+        <p:nvSpPr>
+          <p:cNvPr id="3" name="Content Placeholder 2"/>
+          <p:cNvSpPr>
+            <a:spLocks noGrp="1"/>
+          </p:cNvSpPr>
+          <p:nvPr>
+            <p:ph idx="1"/>
+          </p:nvPr>
+        </p:nvSpPr>
+        <p:spPr/>
+        <p:txBody>
+          <a:bodyPr>
+            <a:normAutofit fontScale="92500" lnSpcReduction="10000"/>
+          </a:bodyPr>
+          <a:lstStyle/>
+          <a:p>
+            <a:r>
+              <a:rPr lang="en-US" dirty="0" smtClean="0"/>
+              <a:t>Need traceability from integration test to High Level Design (HLD)</a:t>
+            </a:r>
+          </a:p>
+          <a:p>
+            <a:pPr lvl="1"/>
+            <a:r>
+              <a:rPr lang="en-US" dirty="0" smtClean="0"/>
+              <a:t>Testing component integration: exercise all component interfaces</a:t>
+            </a:r>
+          </a:p>
+          <a:p>
+            <a:pPr lvl="1"/>
+            <a:r>
+              <a:rPr lang="en-US" dirty="0" smtClean="0"/>
+              <a:t>We also need to observe intermediate, output arcs, and documented side effects</a:t>
+            </a:r>
+            <a:endParaRPr lang="en-US" dirty="0"/>
+          </a:p>
+          <a:p>
+            <a:r>
+              <a:rPr lang="en-US" dirty="0" smtClean="0"/>
+              <a:t>Concentrate on component interactions (let unit test tests each component); observe module interactions</a:t>
+            </a:r>
+          </a:p>
+          <a:p>
+            <a:r>
+              <a:rPr lang="en-US" dirty="0" smtClean="0"/>
+              <a:t>Exercise all interfaces. Use SDs and HLD info to drive testing</a:t>
+            </a:r>
+          </a:p>
+          <a:p>
+            <a:pPr lvl="1"/>
+            <a:r>
+              <a:rPr lang="en-US" dirty="0" smtClean="0"/>
+              <a:t>Interaction test coverage: are all arcs on SDs exercised?</a:t>
+            </a:r>
+          </a:p>
+          <a:p>
+            <a:r>
+              <a:rPr lang="en-US" dirty="0" smtClean="0"/>
+              <a:t>Integration tes</a:t>
+            </a:r>
+            <a:r>
+              <a:rPr lang="en-US" dirty="0" smtClean="0"/>
+              <a:t>t "passed" is also based on output, if all arcs appear, and if the timing is appropriate</a:t>
+            </a:r>
+          </a:p>
+          <a:p>
+            <a:r>
+              <a:rPr lang="en-US" dirty="0" smtClean="0"/>
+              <a:t>Integration testing should exercise "message" structure</a:t>
+            </a:r>
+          </a:p>
+          <a:p>
+            <a:pPr lvl="1"/>
+            <a:r>
+              <a:rPr lang="en-US" dirty="0" smtClean="0"/>
+              <a:t>HLD will have the message dictionary</a:t>
+            </a:r>
+            <a:endParaRPr lang="en-US" dirty="0" smtClean="0"/>
+          </a:p>
+        </p:txBody>
+      </p:sp>
+      <p:sp>
+        <p:nvSpPr>
+          <p:cNvPr id="4" name="Footer Placeholder 3"/>
+          <p:cNvSpPr>
+            <a:spLocks noGrp="1"/>
+          </p:cNvSpPr>
+          <p:nvPr>
+            <p:ph type="ftr" sz="quarter" idx="11"/>
+          </p:nvPr>
+        </p:nvSpPr>
+        <p:spPr/>
+        <p:txBody>
+          <a:bodyPr/>
+          <a:lstStyle/>
+          <a:p>
+            <a:r>
+              <a:rPr lang="en-US" smtClean="0"/>
+              <a:t>NGUYEN_Todd_noid</a:t>
+            </a:r>
+            <a:endParaRPr lang="en-US"/>
+          </a:p>
+        </p:txBody>
+      </p:sp>
+      <p:sp>
+        <p:nvSpPr>
+          <p:cNvPr id="5" name="Slide Number Placeholder 4"/>
+          <p:cNvSpPr>
+            <a:spLocks noGrp="1"/>
+          </p:cNvSpPr>
+          <p:nvPr>
+            <p:ph type="sldNum" sz="quarter" idx="12"/>
+          </p:nvPr>
+        </p:nvSpPr>
+        <p:spPr/>
+        <p:txBody>
+          <a:bodyPr/>
+          <a:lstStyle/>
+          <a:p>
+            <a:fld id="{DAAA4506-2605-4298-B94A-EC5D3A4D4A3F}" type="slidenum">
+              <a:rPr lang="en-US" smtClean="0"/>
+              <a:pPr/>
+              <a:t>21</a:t>
+            </a:fld>
+            <a:endParaRPr lang="en-US" dirty="0"/>
+          </a:p>
+        </p:txBody>
+      </p:sp>
+    </p:spTree>
+    <p:extLst>
+      <p:ext uri="{BB962C8B-B14F-4D97-AF65-F5344CB8AC3E}">
+        <p14:creationId xmlns:p14="http://schemas.microsoft.com/office/powerpoint/2010/main" val="2357465462"/>
+      </p:ext>
+    </p:extLst>
+  </p:cSld>
+  <p:clrMapOvr>
+    <a:masterClrMapping/>
+  </p:clrMapOvr>
+  <mc:AlternateContent xmlns:mc="http://schemas.openxmlformats.org/markup-compatibility/2006" xmlns:p14="http://schemas.microsoft.com/office/powerpoint/2010/main">
+    <mc:Choice Requires="p14">
+      <p:transition spd="slow" p14:dur="2000"/>
+    </mc:Choice>
+    <mc:Fallback xmlns="">
+      <p:transition spd="slow"/>
+    </mc:Fallback>
+  </mc:AlternateContent>
+  <p:timing>
+    <p:tnLst>
+      <p:par>
+        <p:cTn id="1" dur="indefinite" restart="never" nodeType="tmRoot">
+          <p:childTnLst>
+            <p:seq concurrent="1" nextAc="seek">
+              <p:cTn id="2" dur="indefinite" nodeType="mainSeq">
+                <p:childTnLst>
+                  <p:par>
+                    <p:cTn id="3" fill="hold">
+                      <p:stCondLst>
+                        <p:cond delay="indefinite"/>
+                      </p:stCondLst>
+                      <p:childTnLst>
+                        <p:par>
+                          <p:cTn id="4" fill="hold">
+                            <p:stCondLst>
+                              <p:cond delay="0"/>
+                            </p:stCondLst>
+                            <p:childTnLst>
+                              <p:par>
+                                <p:cTn id="5" presetID="10" presetClass="entr" presetSubtype="0" fill="hold" grpId="0" nodeType="clickEffect">
+                                  <p:stCondLst>
+                                    <p:cond delay="0"/>
+                                  </p:stCondLst>
+                                  <p:childTnLst>
+                                    <p:set>
+                                      <p:cBhvr>
+                                        <p:cTn id="6" dur="1" fill="hold">
+                                          <p:stCondLst>
+                                            <p:cond delay="0"/>
+                                          </p:stCondLst>
+                                        </p:cTn>
+                                        <p:tgtEl>
+                                          <p:spTgt spid="3">
+                                            <p:txEl>
+                                              <p:pRg st="0" end="0"/>
+                                            </p:txEl>
+                                          </p:spTgt>
+                                        </p:tgtEl>
+                                        <p:attrNameLst>
+                                          <p:attrName>style.visibility</p:attrName>
+                                        </p:attrNameLst>
+                                      </p:cBhvr>
+                                      <p:to>
+                                        <p:strVal val="visible"/>
+                                      </p:to>
+                                    </p:set>
+                                    <p:animEffect transition="in" filter="fade">
+                                      <p:cBhvr>
+                                        <p:cTn id="7" dur="500"/>
+                                        <p:tgtEl>
+                                          <p:spTgt spid="3">
+                                            <p:txEl>
+                                              <p:pRg st="0" end="0"/>
+                                            </p:txEl>
+                                          </p:spTgt>
+                                        </p:tgtEl>
+                                      </p:cBhvr>
+                                    </p:animEffect>
+                                  </p:childTnLst>
+                                </p:cTn>
+                              </p:par>
+                              <p:par>
+                                <p:cTn id="8" presetID="10" presetClass="entr" presetSubtype="0" fill="hold" grpId="0" nodeType="withEffect">
+                                  <p:stCondLst>
+                                    <p:cond delay="0"/>
+                                  </p:stCondLst>
+                                  <p:childTnLst>
+                                    <p:set>
+                                      <p:cBhvr>
+                                        <p:cTn id="9" dur="1" fill="hold">
+                                          <p:stCondLst>
+                                            <p:cond delay="0"/>
+                                          </p:stCondLst>
+                                        </p:cTn>
+                                        <p:tgtEl>
+                                          <p:spTgt spid="3">
+                                            <p:txEl>
+                                              <p:pRg st="1" end="1"/>
+                                            </p:txEl>
+                                          </p:spTgt>
+                                        </p:tgtEl>
+                                        <p:attrNameLst>
+                                          <p:attrName>style.visibility</p:attrName>
+                                        </p:attrNameLst>
+                                      </p:cBhvr>
+                                      <p:to>
+                                        <p:strVal val="visible"/>
+                                      </p:to>
+                                    </p:set>
+                                    <p:animEffect transition="in" filter="fade">
+                                      <p:cBhvr>
+                                        <p:cTn id="10" dur="500"/>
+                                        <p:tgtEl>
+                                          <p:spTgt spid="3">
+                                            <p:txEl>
+                                              <p:pRg st="1" end="1"/>
+                                            </p:txEl>
+                                          </p:spTgt>
+                                        </p:tgtEl>
+                                      </p:cBhvr>
+                                    </p:animEffect>
+                                  </p:childTnLst>
+                                </p:cTn>
+                              </p:par>
+                              <p:par>
+                                <p:cTn id="11" presetID="10" presetClass="entr" presetSubtype="0" fill="hold" grpId="0" nodeType="withEffect">
+                                  <p:stCondLst>
+                                    <p:cond delay="0"/>
+                                  </p:stCondLst>
+                                  <p:childTnLst>
+                                    <p:set>
+                                      <p:cBhvr>
+                                        <p:cTn id="12" dur="1" fill="hold">
+                                          <p:stCondLst>
+                                            <p:cond delay="0"/>
+                                          </p:stCondLst>
+                                        </p:cTn>
+                                        <p:tgtEl>
+                                          <p:spTgt spid="3">
+                                            <p:txEl>
+                                              <p:pRg st="2" end="2"/>
+                                            </p:txEl>
+                                          </p:spTgt>
+                                        </p:tgtEl>
+                                        <p:attrNameLst>
+                                          <p:attrName>style.visibility</p:attrName>
+                                        </p:attrNameLst>
+                                      </p:cBhvr>
+                                      <p:to>
+                                        <p:strVal val="visible"/>
+                                      </p:to>
+                                    </p:set>
+                                    <p:animEffect transition="in" filter="fade">
+                                      <p:cBhvr>
+                                        <p:cTn id="13" dur="500"/>
+                                        <p:tgtEl>
+                                          <p:spTgt spid="3">
+                                            <p:txEl>
+                                              <p:pRg st="2" end="2"/>
+                                            </p:txEl>
+                                          </p:spTgt>
+                                        </p:tgtEl>
+                                      </p:cBhvr>
+                                    </p:animEffect>
+                                  </p:childTnLst>
+                                </p:cTn>
+                              </p:par>
+                            </p:childTnLst>
+                          </p:cTn>
+                        </p:par>
+                      </p:childTnLst>
+                    </p:cTn>
+                  </p:par>
+                  <p:par>
+                    <p:cTn id="14" fill="hold">
+                      <p:stCondLst>
+                        <p:cond delay="indefinite"/>
+                      </p:stCondLst>
+                      <p:childTnLst>
+                        <p:par>
+                          <p:cTn id="15" fill="hold">
+                            <p:stCondLst>
+                              <p:cond delay="0"/>
+                            </p:stCondLst>
+                            <p:childTnLst>
+                              <p:par>
+                                <p:cTn id="16" presetID="10" presetClass="entr" presetSubtype="0" fill="hold" grpId="0" nodeType="clickEffect">
+                                  <p:stCondLst>
+                                    <p:cond delay="0"/>
+                                  </p:stCondLst>
+                                  <p:childTnLst>
+                                    <p:set>
+                                      <p:cBhvr>
+                                        <p:cTn id="17" dur="1" fill="hold">
+                                          <p:stCondLst>
+                                            <p:cond delay="0"/>
+                                          </p:stCondLst>
+                                        </p:cTn>
+                                        <p:tgtEl>
+                                          <p:spTgt spid="3">
+                                            <p:txEl>
+                                              <p:pRg st="3" end="3"/>
+                                            </p:txEl>
+                                          </p:spTgt>
+                                        </p:tgtEl>
+                                        <p:attrNameLst>
+                                          <p:attrName>style.visibility</p:attrName>
+                                        </p:attrNameLst>
+                                      </p:cBhvr>
+                                      <p:to>
+                                        <p:strVal val="visible"/>
+                                      </p:to>
+                                    </p:set>
+                                    <p:animEffect transition="in" filter="fade">
+                                      <p:cBhvr>
+                                        <p:cTn id="18" dur="500"/>
+                                        <p:tgtEl>
+                                          <p:spTgt spid="3">
+                                            <p:txEl>
+                                              <p:pRg st="3" end="3"/>
+                                            </p:txEl>
+                                          </p:spTgt>
+                                        </p:tgtEl>
+                                      </p:cBhvr>
+                                    </p:animEffect>
+                                  </p:childTnLst>
+                                </p:cTn>
+                              </p:par>
+                            </p:childTnLst>
+                          </p:cTn>
+                        </p:par>
+                      </p:childTnLst>
+                    </p:cTn>
+                  </p:par>
+                  <p:par>
+                    <p:cTn id="19" fill="hold">
+                      <p:stCondLst>
+                        <p:cond delay="indefinite"/>
+                      </p:stCondLst>
+                      <p:childTnLst>
+                        <p:par>
+                          <p:cTn id="20" fill="hold">
+                            <p:stCondLst>
+                              <p:cond delay="0"/>
+                            </p:stCondLst>
+                            <p:childTnLst>
+                              <p:par>
+                                <p:cTn id="21" presetID="10" presetClass="entr" presetSubtype="0" fill="hold" grpId="0" nodeType="clickEffect">
+                                  <p:stCondLst>
+                                    <p:cond delay="0"/>
+                                  </p:stCondLst>
+                                  <p:childTnLst>
+                                    <p:set>
+                                      <p:cBhvr>
+                                        <p:cTn id="22" dur="1" fill="hold">
+                                          <p:stCondLst>
+                                            <p:cond delay="0"/>
+                                          </p:stCondLst>
+                                        </p:cTn>
+                                        <p:tgtEl>
+                                          <p:spTgt spid="3">
+                                            <p:txEl>
+                                              <p:pRg st="4" end="4"/>
+                                            </p:txEl>
+                                          </p:spTgt>
+                                        </p:tgtEl>
+                                        <p:attrNameLst>
+                                          <p:attrName>style.visibility</p:attrName>
+                                        </p:attrNameLst>
+                                      </p:cBhvr>
+                                      <p:to>
+                                        <p:strVal val="visible"/>
+                                      </p:to>
+                                    </p:set>
+                                    <p:animEffect transition="in" filter="fade">
+                                      <p:cBhvr>
+                                        <p:cTn id="23" dur="500"/>
+                                        <p:tgtEl>
+                                          <p:spTgt spid="3">
+                                            <p:txEl>
+                                              <p:pRg st="4" end="4"/>
+                                            </p:txEl>
+                                          </p:spTgt>
+                                        </p:tgtEl>
+                                      </p:cBhvr>
+                                    </p:animEffect>
+                                  </p:childTnLst>
+                                </p:cTn>
+                              </p:par>
+                              <p:par>
+                                <p:cTn id="24" presetID="10" presetClass="entr" presetSubtype="0" fill="hold" grpId="0" nodeType="withEffect">
+                                  <p:stCondLst>
+                                    <p:cond delay="0"/>
+                                  </p:stCondLst>
+                                  <p:childTnLst>
+                                    <p:set>
+                                      <p:cBhvr>
+                                        <p:cTn id="25" dur="1" fill="hold">
+                                          <p:stCondLst>
+                                            <p:cond delay="0"/>
+                                          </p:stCondLst>
+                                        </p:cTn>
+                                        <p:tgtEl>
+                                          <p:spTgt spid="3">
+                                            <p:txEl>
+                                              <p:pRg st="5" end="5"/>
+                                            </p:txEl>
+                                          </p:spTgt>
+                                        </p:tgtEl>
+                                        <p:attrNameLst>
+                                          <p:attrName>style.visibility</p:attrName>
+                                        </p:attrNameLst>
+                                      </p:cBhvr>
+                                      <p:to>
+                                        <p:strVal val="visible"/>
+                                      </p:to>
+                                    </p:set>
+                                    <p:animEffect transition="in" filter="fade">
+                                      <p:cBhvr>
+                                        <p:cTn id="26" dur="500"/>
+                                        <p:tgtEl>
+                                          <p:spTgt spid="3">
+                                            <p:txEl>
+                                              <p:pRg st="5" end="5"/>
+                                            </p:txEl>
+                                          </p:spTgt>
+                                        </p:tgtEl>
+                                      </p:cBhvr>
+                                    </p:animEffect>
+                                  </p:childTnLst>
+                                </p:cTn>
+                              </p:par>
+                            </p:childTnLst>
+                          </p:cTn>
+                        </p:par>
+                      </p:childTnLst>
+                    </p:cTn>
+                  </p:par>
+                  <p:par>
+                    <p:cTn id="27" fill="hold">
+                      <p:stCondLst>
+                        <p:cond delay="indefinite"/>
+                      </p:stCondLst>
+                      <p:childTnLst>
+                        <p:par>
+                          <p:cTn id="28" fill="hold">
+                            <p:stCondLst>
+                              <p:cond delay="0"/>
+                            </p:stCondLst>
+                            <p:childTnLst>
+                              <p:par>
+                                <p:cTn id="29" presetID="10" presetClass="entr" presetSubtype="0" fill="hold" grpId="0" nodeType="clickEffect">
+                                  <p:stCondLst>
+                                    <p:cond delay="0"/>
+                                  </p:stCondLst>
+                                  <p:childTnLst>
+                                    <p:set>
+                                      <p:cBhvr>
+                                        <p:cTn id="30" dur="1" fill="hold">
+                                          <p:stCondLst>
+                                            <p:cond delay="0"/>
+                                          </p:stCondLst>
+                                        </p:cTn>
+                                        <p:tgtEl>
+                                          <p:spTgt spid="3">
+                                            <p:txEl>
+                                              <p:pRg st="6" end="6"/>
+                                            </p:txEl>
+                                          </p:spTgt>
+                                        </p:tgtEl>
+                                        <p:attrNameLst>
+                                          <p:attrName>style.visibility</p:attrName>
+                                        </p:attrNameLst>
+                                      </p:cBhvr>
+                                      <p:to>
+                                        <p:strVal val="visible"/>
+                                      </p:to>
+                                    </p:set>
+                                    <p:animEffect transition="in" filter="fade">
+                                      <p:cBhvr>
+                                        <p:cTn id="31" dur="500"/>
+                                        <p:tgtEl>
+                                          <p:spTgt spid="3">
+                                            <p:txEl>
+                                              <p:pRg st="6" end="6"/>
+                                            </p:txEl>
+                                          </p:spTgt>
+                                        </p:tgtEl>
+                                      </p:cBhvr>
+                                    </p:animEffect>
+                                  </p:childTnLst>
+                                </p:cTn>
+                              </p:par>
+                            </p:childTnLst>
+                          </p:cTn>
+                        </p:par>
+                      </p:childTnLst>
+                    </p:cTn>
+                  </p:par>
+                  <p:par>
+                    <p:cTn id="32" fill="hold">
+                      <p:stCondLst>
+                        <p:cond delay="indefinite"/>
+                      </p:stCondLst>
+                      <p:childTnLst>
+                        <p:par>
+                          <p:cTn id="33" fill="hold">
+                            <p:stCondLst>
+                              <p:cond delay="0"/>
+                            </p:stCondLst>
+                            <p:childTnLst>
+                              <p:par>
+                                <p:cTn id="34" presetID="10" presetClass="entr" presetSubtype="0" fill="hold" grpId="0" nodeType="clickEffect">
+                                  <p:stCondLst>
+                                    <p:cond delay="0"/>
+                                  </p:stCondLst>
+                                  <p:childTnLst>
+                                    <p:set>
+                                      <p:cBhvr>
+                                        <p:cTn id="35" dur="1" fill="hold">
+                                          <p:stCondLst>
+                                            <p:cond delay="0"/>
+                                          </p:stCondLst>
+                                        </p:cTn>
+                                        <p:tgtEl>
+                                          <p:spTgt spid="3">
+                                            <p:txEl>
+                                              <p:pRg st="7" end="7"/>
+                                            </p:txEl>
+                                          </p:spTgt>
+                                        </p:tgtEl>
+                                        <p:attrNameLst>
+                                          <p:attrName>style.visibility</p:attrName>
+                                        </p:attrNameLst>
+                                      </p:cBhvr>
+                                      <p:to>
+                                        <p:strVal val="visible"/>
+                                      </p:to>
+                                    </p:set>
+                                    <p:animEffect transition="in" filter="fade">
+                                      <p:cBhvr>
+                                        <p:cTn id="36" dur="500"/>
+                                        <p:tgtEl>
+                                          <p:spTgt spid="3">
+                                            <p:txEl>
+                                              <p:pRg st="7" end="7"/>
+                                            </p:txEl>
+                                          </p:spTgt>
+                                        </p:tgtEl>
+                                      </p:cBhvr>
+                                    </p:animEffect>
+                                  </p:childTnLst>
+                                </p:cTn>
+                              </p:par>
+                              <p:par>
+                                <p:cTn id="37" presetID="10" presetClass="entr" presetSubtype="0" fill="hold" grpId="0" nodeType="withEffect">
+                                  <p:stCondLst>
+                                    <p:cond delay="0"/>
+                                  </p:stCondLst>
+                                  <p:childTnLst>
+                                    <p:set>
+                                      <p:cBhvr>
+                                        <p:cTn id="38" dur="1" fill="hold">
+                                          <p:stCondLst>
+                                            <p:cond delay="0"/>
+                                          </p:stCondLst>
+                                        </p:cTn>
+                                        <p:tgtEl>
+                                          <p:spTgt spid="3">
+                                            <p:txEl>
+                                              <p:pRg st="8" end="8"/>
+                                            </p:txEl>
+                                          </p:spTgt>
+                                        </p:tgtEl>
+                                        <p:attrNameLst>
+                                          <p:attrName>style.visibility</p:attrName>
+                                        </p:attrNameLst>
+                                      </p:cBhvr>
+                                      <p:to>
+                                        <p:strVal val="visible"/>
+                                      </p:to>
+                                    </p:set>
+                                    <p:animEffect transition="in" filter="fade">
+                                      <p:cBhvr>
+                                        <p:cTn id="39" dur="500"/>
+                                        <p:tgtEl>
+                                          <p:spTgt spid="3">
+                                            <p:txEl>
+                                              <p:pRg st="8" end="8"/>
+                                            </p:txEl>
+                                          </p:spTgt>
+                                        </p:tgtEl>
+                                      </p:cBhvr>
+                                    </p:animEffect>
+                                  </p:childTnLst>
+                                </p:cTn>
+                              </p:par>
+                            </p:childTnLst>
+                          </p:cTn>
+                        </p:par>
+                      </p:childTnLst>
+                    </p:cTn>
+                  </p:par>
+                </p:childTnLst>
+              </p:cTn>
+              <p:prevCondLst>
+                <p:cond evt="onPrev" delay="0">
+                  <p:tgtEl>
+                    <p:sldTgt/>
+                  </p:tgtEl>
+                </p:cond>
+              </p:prevCondLst>
+              <p:nextCondLst>
+                <p:cond evt="onNext" delay="0">
+                  <p:tgtEl>
+                    <p:sldTgt/>
+                  </p:tgtEl>
+                </p:cond>
+              </p:nextCondLst>
+            </p:seq>
+          </p:childTnLst>
+        </p:cTn>
+      </p:par>
+    </p:tnLst>
+    <p:bldLst>
+      <p:bldP spid="3" grpId="0" build="p"/>
+    </p:bldLst>
+  </p:timing>
+</p:sld>
+</file>
+
+<file path=ppt/slides/slide22.xml><?xml version="1.0" encoding="utf-8"?>
+<p:sld xmlns:a="http://schemas.openxmlformats.org/drawingml/2006/main" xmlns:r="http://schemas.openxmlformats.org/officeDocument/2006/relationships" xmlns:p="http://schemas.openxmlformats.org/presentationml/2006/main">
+  <p:cSld>
+    <p:spTree>
+      <p:nvGrpSpPr>
+        <p:cNvPr id="1" name=""/>
+        <p:cNvGrpSpPr/>
+        <p:nvPr/>
+      </p:nvGrpSpPr>
+      <p:grpSpPr>
+        <a:xfrm>
+          <a:off x="0" y="0"/>
+          <a:ext cx="0" cy="0"/>
+          <a:chOff x="0" y="0"/>
+          <a:chExt cx="0" cy="0"/>
+        </a:xfrm>
+      </p:grpSpPr>
+      <p:sp>
+        <p:nvSpPr>
+          <p:cNvPr id="2" name="Title 1"/>
+          <p:cNvSpPr>
+            <a:spLocks noGrp="1"/>
+          </p:cNvSpPr>
+          <p:nvPr>
+            <p:ph type="title"/>
+          </p:nvPr>
+        </p:nvSpPr>
+        <p:spPr/>
+        <p:txBody>
+          <a:bodyPr/>
+          <a:lstStyle/>
+          <a:p>
+            <a:r>
+              <a:rPr lang="en-US" dirty="0"/>
+              <a:t>21-3. Lect. </a:t>
+            </a:r>
+            <a:r>
+              <a:rPr lang="en-US" dirty="0" smtClean="0"/>
+              <a:t>18 – System Level Test</a:t>
+            </a:r>
+            <a:endParaRPr lang="en-US" dirty="0"/>
+          </a:p>
+        </p:txBody>
+      </p:sp>
+      <p:sp>
+        <p:nvSpPr>
+          <p:cNvPr id="3" name="Content Placeholder 2"/>
+          <p:cNvSpPr>
+            <a:spLocks noGrp="1"/>
+          </p:cNvSpPr>
+          <p:nvPr>
+            <p:ph idx="1"/>
+          </p:nvPr>
+        </p:nvSpPr>
+        <p:spPr/>
+        <p:txBody>
+          <a:bodyPr>
+            <a:normAutofit/>
+          </a:bodyPr>
+          <a:lstStyle/>
+          <a:p>
+            <a:r>
+              <a:rPr lang="en-US" dirty="0" smtClean="0"/>
+              <a:t>Excessive defect should not "escape" to field testing</a:t>
+            </a:r>
+          </a:p>
+          <a:p>
+            <a:r>
+              <a:rPr lang="en-US" dirty="0" smtClean="0"/>
+              <a:t>System-level "acceptance test" emphasizes customer-type usage</a:t>
+            </a:r>
+          </a:p>
+          <a:p>
+            <a:r>
+              <a:rPr lang="en-US" dirty="0" smtClean="0"/>
+              <a:t>System test plan covers </a:t>
+            </a:r>
+            <a:r>
+              <a:rPr lang="en-US" b="1" dirty="0" smtClean="0"/>
+              <a:t>ALL</a:t>
+            </a:r>
+            <a:r>
+              <a:rPr lang="en-US" dirty="0" smtClean="0"/>
+              <a:t> requirements</a:t>
+            </a:r>
+          </a:p>
+          <a:p>
+            <a:pPr lvl="1"/>
+            <a:r>
+              <a:rPr lang="en-US" dirty="0" smtClean="0"/>
+              <a:t>For an embedded system I/O, we can use a HAL and swap in simulator</a:t>
+            </a:r>
+          </a:p>
+          <a:p>
+            <a:r>
+              <a:rPr lang="en-US" dirty="0" smtClean="0"/>
+              <a:t>Bugs found in system test is a </a:t>
+            </a:r>
+            <a:r>
+              <a:rPr lang="en-US" b="1" dirty="0" smtClean="0"/>
+              <a:t>PROCESS</a:t>
+            </a:r>
+            <a:r>
+              <a:rPr lang="en-US" dirty="0" smtClean="0"/>
+              <a:t> failure</a:t>
+            </a:r>
+          </a:p>
+          <a:p>
+            <a:pPr lvl="1"/>
+            <a:r>
+              <a:rPr lang="en-US" dirty="0" smtClean="0"/>
+              <a:t>System requirement defects should be most of what you find</a:t>
+            </a:r>
+          </a:p>
+          <a:p>
+            <a:r>
+              <a:rPr lang="en-US" dirty="0" smtClean="0"/>
+              <a:t>Testing fault management is hard if you haven't </a:t>
+            </a:r>
+            <a:r>
+              <a:rPr lang="en-US" smtClean="0"/>
+              <a:t>planned for it</a:t>
+            </a:r>
+            <a:endParaRPr lang="en-US" dirty="0" smtClean="0"/>
+          </a:p>
+        </p:txBody>
+      </p:sp>
+      <p:sp>
+        <p:nvSpPr>
+          <p:cNvPr id="4" name="Footer Placeholder 3"/>
+          <p:cNvSpPr>
+            <a:spLocks noGrp="1"/>
+          </p:cNvSpPr>
+          <p:nvPr>
+            <p:ph type="ftr" sz="quarter" idx="11"/>
+          </p:nvPr>
+        </p:nvSpPr>
+        <p:spPr/>
+        <p:txBody>
+          <a:bodyPr/>
+          <a:lstStyle/>
+          <a:p>
+            <a:r>
+              <a:rPr lang="en-US" smtClean="0"/>
+              <a:t>NGUYEN_Todd_noid</a:t>
+            </a:r>
+            <a:endParaRPr lang="en-US"/>
+          </a:p>
+        </p:txBody>
+      </p:sp>
+      <p:sp>
+        <p:nvSpPr>
+          <p:cNvPr id="5" name="Slide Number Placeholder 4"/>
+          <p:cNvSpPr>
+            <a:spLocks noGrp="1"/>
+          </p:cNvSpPr>
+          <p:nvPr>
+            <p:ph type="sldNum" sz="quarter" idx="12"/>
+          </p:nvPr>
+        </p:nvSpPr>
+        <p:spPr/>
+        <p:txBody>
+          <a:bodyPr/>
+          <a:lstStyle/>
+          <a:p>
+            <a:fld id="{DAAA4506-2605-4298-B94A-EC5D3A4D4A3F}" type="slidenum">
+              <a:rPr lang="en-US" smtClean="0"/>
+              <a:pPr/>
+              <a:t>22</a:t>
+            </a:fld>
+            <a:endParaRPr lang="en-US" dirty="0"/>
+          </a:p>
+        </p:txBody>
+      </p:sp>
+    </p:spTree>
+    <p:extLst>
+      <p:ext uri="{BB962C8B-B14F-4D97-AF65-F5344CB8AC3E}">
+        <p14:creationId xmlns:p14="http://schemas.microsoft.com/office/powerpoint/2010/main" val="3909906709"/>
+      </p:ext>
+    </p:extLst>
+  </p:cSld>
+  <p:clrMapOvr>
+    <a:masterClrMapping/>
+  </p:clrMapOvr>
+  <mc:AlternateContent xmlns:mc="http://schemas.openxmlformats.org/markup-compatibility/2006" xmlns:p14="http://schemas.microsoft.com/office/powerpoint/2010/main">
+    <mc:Choice Requires="p14">
+      <p:transition spd="slow" p14:dur="2000"/>
+    </mc:Choice>
+    <mc:Fallback xmlns="">
+      <p:transition spd="slow"/>
+    </mc:Fallback>
+  </mc:AlternateContent>
+  <p:timing>
+    <p:tnLst>
+      <p:par>
+        <p:cTn id="1" dur="indefinite" restart="never" nodeType="tmRoot">
+          <p:childTnLst>
+            <p:seq concurrent="1" nextAc="seek">
+              <p:cTn id="2" dur="indefinite" nodeType="mainSeq">
+                <p:childTnLst>
+                  <p:par>
+                    <p:cTn id="3" fill="hold">
+                      <p:stCondLst>
+                        <p:cond delay="indefinite"/>
+                      </p:stCondLst>
+                      <p:childTnLst>
+                        <p:par>
+                          <p:cTn id="4" fill="hold">
+                            <p:stCondLst>
+                              <p:cond delay="0"/>
+                            </p:stCondLst>
+                            <p:childTnLst>
+                              <p:par>
+                                <p:cTn id="5" presetID="10" presetClass="entr" presetSubtype="0" fill="hold" grpId="0" nodeType="clickEffect">
+                                  <p:stCondLst>
+                                    <p:cond delay="0"/>
+                                  </p:stCondLst>
+                                  <p:childTnLst>
+                                    <p:set>
+                                      <p:cBhvr>
+                                        <p:cTn id="6" dur="1" fill="hold">
+                                          <p:stCondLst>
+                                            <p:cond delay="0"/>
+                                          </p:stCondLst>
+                                        </p:cTn>
+                                        <p:tgtEl>
+                                          <p:spTgt spid="3">
+                                            <p:txEl>
+                                              <p:pRg st="0" end="0"/>
+                                            </p:txEl>
+                                          </p:spTgt>
+                                        </p:tgtEl>
+                                        <p:attrNameLst>
+                                          <p:attrName>style.visibility</p:attrName>
+                                        </p:attrNameLst>
+                                      </p:cBhvr>
+                                      <p:to>
+                                        <p:strVal val="visible"/>
+                                      </p:to>
+                                    </p:set>
+                                    <p:animEffect transition="in" filter="fade">
+                                      <p:cBhvr>
+                                        <p:cTn id="7" dur="500"/>
+                                        <p:tgtEl>
+                                          <p:spTgt spid="3">
+                                            <p:txEl>
+                                              <p:pRg st="0" end="0"/>
+                                            </p:txEl>
+                                          </p:spTgt>
+                                        </p:tgtEl>
+                                      </p:cBhvr>
+                                    </p:animEffect>
+                                  </p:childTnLst>
+                                </p:cTn>
+                              </p:par>
+                            </p:childTnLst>
+                          </p:cTn>
+                        </p:par>
+                      </p:childTnLst>
+                    </p:cTn>
+                  </p:par>
+                  <p:par>
+                    <p:cTn id="8" fill="hold">
+                      <p:stCondLst>
+                        <p:cond delay="indefinite"/>
+                      </p:stCondLst>
+                      <p:childTnLst>
+                        <p:par>
+                          <p:cTn id="9" fill="hold">
+                            <p:stCondLst>
+                              <p:cond delay="0"/>
+                            </p:stCondLst>
+                            <p:childTnLst>
+                              <p:par>
+                                <p:cTn id="10" presetID="10" presetClass="entr" presetSubtype="0" fill="hold" grpId="0" nodeType="clickEffect">
+                                  <p:stCondLst>
+                                    <p:cond delay="0"/>
+                                  </p:stCondLst>
+                                  <p:childTnLst>
+                                    <p:set>
+                                      <p:cBhvr>
+                                        <p:cTn id="11" dur="1" fill="hold">
+                                          <p:stCondLst>
+                                            <p:cond delay="0"/>
+                                          </p:stCondLst>
+                                        </p:cTn>
+                                        <p:tgtEl>
+                                          <p:spTgt spid="3">
+                                            <p:txEl>
+                                              <p:pRg st="1" end="1"/>
+                                            </p:txEl>
+                                          </p:spTgt>
+                                        </p:tgtEl>
+                                        <p:attrNameLst>
+                                          <p:attrName>style.visibility</p:attrName>
+                                        </p:attrNameLst>
+                                      </p:cBhvr>
+                                      <p:to>
+                                        <p:strVal val="visible"/>
+                                      </p:to>
+                                    </p:set>
+                                    <p:animEffect transition="in" filter="fade">
+                                      <p:cBhvr>
+                                        <p:cTn id="12" dur="500"/>
+                                        <p:tgtEl>
+                                          <p:spTgt spid="3">
+                                            <p:txEl>
+                                              <p:pRg st="1" end="1"/>
+                                            </p:txEl>
+                                          </p:spTgt>
+                                        </p:tgtEl>
+                                      </p:cBhvr>
+                                    </p:animEffect>
+                                  </p:childTnLst>
+                                </p:cTn>
+                              </p:par>
+                            </p:childTnLst>
+                          </p:cTn>
+                        </p:par>
+                      </p:childTnLst>
+                    </p:cTn>
+                  </p:par>
+                  <p:par>
+                    <p:cTn id="13" fill="hold">
+                      <p:stCondLst>
+                        <p:cond delay="indefinite"/>
+                      </p:stCondLst>
+                      <p:childTnLst>
+                        <p:par>
+                          <p:cTn id="14" fill="hold">
+                            <p:stCondLst>
+                              <p:cond delay="0"/>
+                            </p:stCondLst>
+                            <p:childTnLst>
+                              <p:par>
+                                <p:cTn id="15" presetID="10" presetClass="entr" presetSubtype="0" fill="hold" grpId="0" nodeType="clickEffect">
+                                  <p:stCondLst>
+                                    <p:cond delay="0"/>
+                                  </p:stCondLst>
+                                  <p:childTnLst>
+                                    <p:set>
+                                      <p:cBhvr>
+                                        <p:cTn id="16" dur="1" fill="hold">
+                                          <p:stCondLst>
+                                            <p:cond delay="0"/>
+                                          </p:stCondLst>
+                                        </p:cTn>
+                                        <p:tgtEl>
+                                          <p:spTgt spid="3">
+                                            <p:txEl>
+                                              <p:pRg st="2" end="2"/>
+                                            </p:txEl>
+                                          </p:spTgt>
+                                        </p:tgtEl>
+                                        <p:attrNameLst>
+                                          <p:attrName>style.visibility</p:attrName>
+                                        </p:attrNameLst>
+                                      </p:cBhvr>
+                                      <p:to>
+                                        <p:strVal val="visible"/>
+                                      </p:to>
+                                    </p:set>
+                                    <p:animEffect transition="in" filter="fade">
+                                      <p:cBhvr>
+                                        <p:cTn id="17" dur="500"/>
+                                        <p:tgtEl>
+                                          <p:spTgt spid="3">
+                                            <p:txEl>
+                                              <p:pRg st="2" end="2"/>
+                                            </p:txEl>
+                                          </p:spTgt>
+                                        </p:tgtEl>
+                                      </p:cBhvr>
+                                    </p:animEffect>
+                                  </p:childTnLst>
+                                </p:cTn>
+                              </p:par>
+                              <p:par>
+                                <p:cTn id="18" presetID="10" presetClass="entr" presetSubtype="0" fill="hold" grpId="0" nodeType="withEffect">
+                                  <p:stCondLst>
+                                    <p:cond delay="0"/>
+                                  </p:stCondLst>
+                                  <p:childTnLst>
+                                    <p:set>
+                                      <p:cBhvr>
+                                        <p:cTn id="19" dur="1" fill="hold">
+                                          <p:stCondLst>
+                                            <p:cond delay="0"/>
+                                          </p:stCondLst>
+                                        </p:cTn>
+                                        <p:tgtEl>
+                                          <p:spTgt spid="3">
+                                            <p:txEl>
+                                              <p:pRg st="3" end="3"/>
+                                            </p:txEl>
+                                          </p:spTgt>
+                                        </p:tgtEl>
+                                        <p:attrNameLst>
+                                          <p:attrName>style.visibility</p:attrName>
+                                        </p:attrNameLst>
+                                      </p:cBhvr>
+                                      <p:to>
+                                        <p:strVal val="visible"/>
+                                      </p:to>
+                                    </p:set>
+                                    <p:animEffect transition="in" filter="fade">
+                                      <p:cBhvr>
+                                        <p:cTn id="20" dur="500"/>
+                                        <p:tgtEl>
+                                          <p:spTgt spid="3">
+                                            <p:txEl>
+                                              <p:pRg st="3" end="3"/>
+                                            </p:txEl>
+                                          </p:spTgt>
+                                        </p:tgtEl>
+                                      </p:cBhvr>
+                                    </p:animEffect>
+                                  </p:childTnLst>
+                                </p:cTn>
+                              </p:par>
+                            </p:childTnLst>
+                          </p:cTn>
+                        </p:par>
+                      </p:childTnLst>
+                    </p:cTn>
+                  </p:par>
+                  <p:par>
+                    <p:cTn id="21" fill="hold">
+                      <p:stCondLst>
+                        <p:cond delay="indefinite"/>
+                      </p:stCondLst>
+                      <p:childTnLst>
+                        <p:par>
+                          <p:cTn id="22" fill="hold">
+                            <p:stCondLst>
+                              <p:cond delay="0"/>
+                            </p:stCondLst>
+                            <p:childTnLst>
+                              <p:par>
+                                <p:cTn id="23" presetID="10" presetClass="entr" presetSubtype="0" fill="hold" grpId="0" nodeType="clickEffect">
+                                  <p:stCondLst>
+                                    <p:cond delay="0"/>
+                                  </p:stCondLst>
+                                  <p:childTnLst>
+                                    <p:set>
+                                      <p:cBhvr>
+                                        <p:cTn id="24" dur="1" fill="hold">
+                                          <p:stCondLst>
+                                            <p:cond delay="0"/>
+                                          </p:stCondLst>
+                                        </p:cTn>
+                                        <p:tgtEl>
+                                          <p:spTgt spid="3">
+                                            <p:txEl>
+                                              <p:pRg st="4" end="4"/>
+                                            </p:txEl>
+                                          </p:spTgt>
+                                        </p:tgtEl>
+                                        <p:attrNameLst>
+                                          <p:attrName>style.visibility</p:attrName>
+                                        </p:attrNameLst>
+                                      </p:cBhvr>
+                                      <p:to>
+                                        <p:strVal val="visible"/>
+                                      </p:to>
+                                    </p:set>
+                                    <p:animEffect transition="in" filter="fade">
+                                      <p:cBhvr>
+                                        <p:cTn id="25" dur="500"/>
+                                        <p:tgtEl>
+                                          <p:spTgt spid="3">
+                                            <p:txEl>
+                                              <p:pRg st="4" end="4"/>
+                                            </p:txEl>
+                                          </p:spTgt>
+                                        </p:tgtEl>
+                                      </p:cBhvr>
+                                    </p:animEffect>
+                                  </p:childTnLst>
+                                </p:cTn>
+                              </p:par>
+                              <p:par>
+                                <p:cTn id="26" presetID="10" presetClass="entr" presetSubtype="0" fill="hold" grpId="0" nodeType="withEffect">
+                                  <p:stCondLst>
+                                    <p:cond delay="0"/>
+                                  </p:stCondLst>
+                                  <p:childTnLst>
+                                    <p:set>
+                                      <p:cBhvr>
+                                        <p:cTn id="27" dur="1" fill="hold">
+                                          <p:stCondLst>
+                                            <p:cond delay="0"/>
+                                          </p:stCondLst>
+                                        </p:cTn>
+                                        <p:tgtEl>
+                                          <p:spTgt spid="3">
+                                            <p:txEl>
+                                              <p:pRg st="5" end="5"/>
+                                            </p:txEl>
+                                          </p:spTgt>
+                                        </p:tgtEl>
+                                        <p:attrNameLst>
+                                          <p:attrName>style.visibility</p:attrName>
+                                        </p:attrNameLst>
+                                      </p:cBhvr>
+                                      <p:to>
+                                        <p:strVal val="visible"/>
+                                      </p:to>
+                                    </p:set>
+                                    <p:animEffect transition="in" filter="fade">
+                                      <p:cBhvr>
+                                        <p:cTn id="28" dur="500"/>
+                                        <p:tgtEl>
+                                          <p:spTgt spid="3">
+                                            <p:txEl>
+                                              <p:pRg st="5" end="5"/>
+                                            </p:txEl>
+                                          </p:spTgt>
+                                        </p:tgtEl>
+                                      </p:cBhvr>
+                                    </p:animEffect>
+                                  </p:childTnLst>
+                                </p:cTn>
+                              </p:par>
+                            </p:childTnLst>
+                          </p:cTn>
+                        </p:par>
+                      </p:childTnLst>
+                    </p:cTn>
+                  </p:par>
+                  <p:par>
+                    <p:cTn id="29" fill="hold">
+                      <p:stCondLst>
+                        <p:cond delay="indefinite"/>
+                      </p:stCondLst>
+                      <p:childTnLst>
+                        <p:par>
+                          <p:cTn id="30" fill="hold">
+                            <p:stCondLst>
+                              <p:cond delay="0"/>
+                            </p:stCondLst>
+                            <p:childTnLst>
+                              <p:par>
+                                <p:cTn id="31" presetID="10" presetClass="entr" presetSubtype="0" fill="hold" grpId="0" nodeType="clickEffect">
+                                  <p:stCondLst>
+                                    <p:cond delay="0"/>
+                                  </p:stCondLst>
+                                  <p:childTnLst>
+                                    <p:set>
+                                      <p:cBhvr>
+                                        <p:cTn id="32" dur="1" fill="hold">
+                                          <p:stCondLst>
+                                            <p:cond delay="0"/>
+                                          </p:stCondLst>
+                                        </p:cTn>
+                                        <p:tgtEl>
+                                          <p:spTgt spid="3">
+                                            <p:txEl>
+                                              <p:pRg st="6" end="6"/>
+                                            </p:txEl>
+                                          </p:spTgt>
+                                        </p:tgtEl>
+                                        <p:attrNameLst>
+                                          <p:attrName>style.visibility</p:attrName>
+                                        </p:attrNameLst>
+                                      </p:cBhvr>
+                                      <p:to>
+                                        <p:strVal val="visible"/>
+                                      </p:to>
+                                    </p:set>
+                                    <p:animEffect transition="in" filter="fade">
+                                      <p:cBhvr>
+                                        <p:cTn id="33" dur="500"/>
+                                        <p:tgtEl>
+                                          <p:spTgt spid="3">
+                                            <p:txEl>
+                                              <p:pRg st="6" end="6"/>
+                                            </p:txEl>
+                                          </p:spTgt>
+                                        </p:tgtEl>
+                                      </p:cBhvr>
+                                    </p:animEffect>
+                                  </p:childTnLst>
+                                </p:cTn>
+                              </p:par>
+                            </p:childTnLst>
+                          </p:cTn>
+                        </p:par>
+                      </p:childTnLst>
+                    </p:cTn>
+                  </p:par>
+                </p:childTnLst>
+              </p:cTn>
+              <p:prevCondLst>
+                <p:cond evt="onPrev" delay="0">
+                  <p:tgtEl>
+                    <p:sldTgt/>
+                  </p:tgtEl>
+                </p:cond>
+              </p:prevCondLst>
+              <p:nextCondLst>
+                <p:cond evt="onNext" delay="0">
+                  <p:tgtEl>
+                    <p:sldTgt/>
+                  </p:tgtEl>
+                </p:cond>
+              </p:nextCondLst>
+            </p:seq>
+          </p:childTnLst>
+        </p:cTn>
+      </p:par>
+    </p:tnLst>
+    <p:bldLst>
+      <p:bldP spid="3" grpId="0" build="p"/>
+    </p:bldLst>
   </p:timing>
 </p:sld>
 </file>
@@ -10044,10 +11938,6 @@
           <a:bodyPr/>
           <a:lstStyle/>
           <a:p>
-            <a:r>
-              <a:rPr lang="en-US" smtClean="0"/>
-              <a:t>/</a:t>
-            </a:r>
             <a:fld id="{DAAA4506-2605-4298-B94A-EC5D3A4D4A3F}" type="slidenum">
               <a:rPr lang="en-US" smtClean="0"/>
               <a:pPr/>
@@ -10067,11 +11957,11 @@
   <p:clrMapOvr>
     <a:masterClrMapping/>
   </p:clrMapOvr>
-  <mc:AlternateContent xmlns:mc="http://schemas.openxmlformats.org/markup-compatibility/2006">
-    <mc:Choice xmlns:p14="http://schemas.microsoft.com/office/powerpoint/2010/main" Requires="p14">
+  <mc:AlternateContent xmlns:mc="http://schemas.openxmlformats.org/markup-compatibility/2006" xmlns:p14="http://schemas.microsoft.com/office/powerpoint/2010/main">
+    <mc:Choice Requires="p14">
       <p:transition spd="slow" p14:dur="2000"/>
     </mc:Choice>
-    <mc:Fallback>
+    <mc:Fallback xmlns="">
       <p:transition spd="slow"/>
     </mc:Fallback>
   </mc:AlternateContent>
@@ -10224,7 +12114,9 @@
         </p:nvSpPr>
         <p:spPr/>
         <p:txBody>
-          <a:bodyPr/>
+          <a:bodyPr>
+            <a:normAutofit/>
+          </a:bodyPr>
           <a:lstStyle/>
           <a:p>
             <a:r>
@@ -10303,10 +12195,6 @@
           <a:bodyPr/>
           <a:lstStyle/>
           <a:p>
-            <a:r>
-              <a:rPr lang="en-US" smtClean="0"/>
-              <a:t>/</a:t>
-            </a:r>
             <a:fld id="{DAAA4506-2605-4298-B94A-EC5D3A4D4A3F}" type="slidenum">
               <a:rPr lang="en-US" smtClean="0"/>
               <a:pPr/>
@@ -10326,11 +12214,11 @@
   <p:clrMapOvr>
     <a:masterClrMapping/>
   </p:clrMapOvr>
-  <mc:AlternateContent xmlns:mc="http://schemas.openxmlformats.org/markup-compatibility/2006">
-    <mc:Choice xmlns:p14="http://schemas.microsoft.com/office/powerpoint/2010/main" Requires="p14">
+  <mc:AlternateContent xmlns:mc="http://schemas.openxmlformats.org/markup-compatibility/2006" xmlns:p14="http://schemas.microsoft.com/office/powerpoint/2010/main">
+    <mc:Choice Requires="p14">
       <p:transition spd="slow" p14:dur="2000"/>
     </mc:Choice>
-    <mc:Fallback>
+    <mc:Fallback xmlns="">
       <p:transition spd="slow"/>
     </mc:Fallback>
   </mc:AlternateContent>
@@ -10851,10 +12739,6 @@
           <a:bodyPr/>
           <a:lstStyle/>
           <a:p>
-            <a:r>
-              <a:rPr lang="en-US" smtClean="0"/>
-              <a:t>/</a:t>
-            </a:r>
             <a:fld id="{DAAA4506-2605-4298-B94A-EC5D3A4D4A3F}" type="slidenum">
               <a:rPr lang="en-US" smtClean="0"/>
               <a:pPr/>
@@ -10874,11 +12758,11 @@
   <p:clrMapOvr>
     <a:masterClrMapping/>
   </p:clrMapOvr>
-  <mc:AlternateContent xmlns:mc="http://schemas.openxmlformats.org/markup-compatibility/2006">
-    <mc:Choice xmlns:p14="http://schemas.microsoft.com/office/powerpoint/2010/main" Requires="p14">
+  <mc:AlternateContent xmlns:mc="http://schemas.openxmlformats.org/markup-compatibility/2006" xmlns:p14="http://schemas.microsoft.com/office/powerpoint/2010/main">
+    <mc:Choice Requires="p14">
       <p:transition spd="slow" p14:dur="2000"/>
     </mc:Choice>
-    <mc:Fallback>
+    <mc:Fallback xmlns="">
       <p:transition spd="slow"/>
     </mc:Fallback>
   </mc:AlternateContent>
@@ -11334,10 +13218,6 @@
           <a:bodyPr/>
           <a:lstStyle/>
           <a:p>
-            <a:r>
-              <a:rPr lang="en-US" smtClean="0"/>
-              <a:t>/</a:t>
-            </a:r>
             <a:fld id="{DAAA4506-2605-4298-B94A-EC5D3A4D4A3F}" type="slidenum">
               <a:rPr lang="en-US" smtClean="0"/>
               <a:pPr/>
@@ -11357,11 +13237,11 @@
   <p:clrMapOvr>
     <a:masterClrMapping/>
   </p:clrMapOvr>
-  <mc:AlternateContent xmlns:mc="http://schemas.openxmlformats.org/markup-compatibility/2006">
-    <mc:Choice xmlns:p14="http://schemas.microsoft.com/office/powerpoint/2010/main" Requires="p14">
+  <mc:AlternateContent xmlns:mc="http://schemas.openxmlformats.org/markup-compatibility/2006" xmlns:p14="http://schemas.microsoft.com/office/powerpoint/2010/main">
+    <mc:Choice Requires="p14">
       <p:transition spd="slow" p14:dur="2000"/>
     </mc:Choice>
-    <mc:Fallback>
+    <mc:Fallback xmlns="">
       <p:transition spd="slow"/>
     </mc:Fallback>
   </mc:AlternateContent>
@@ -11500,10 +13380,6 @@
           <a:bodyPr/>
           <a:lstStyle/>
           <a:p>
-            <a:r>
-              <a:rPr lang="en-US" smtClean="0"/>
-              <a:t>/</a:t>
-            </a:r>
             <a:fld id="{DAAA4506-2605-4298-B94A-EC5D3A4D4A3F}" type="slidenum">
               <a:rPr lang="en-US" smtClean="0"/>
               <a:pPr/>
@@ -11523,11 +13399,11 @@
   <p:clrMapOvr>
     <a:masterClrMapping/>
   </p:clrMapOvr>
-  <mc:AlternateContent xmlns:mc="http://schemas.openxmlformats.org/markup-compatibility/2006">
-    <mc:Choice xmlns:p14="http://schemas.microsoft.com/office/powerpoint/2010/main" Requires="p14">
+  <mc:AlternateContent xmlns:mc="http://schemas.openxmlformats.org/markup-compatibility/2006" xmlns:p14="http://schemas.microsoft.com/office/powerpoint/2010/main">
+    <mc:Choice Requires="p14">
       <p:transition spd="slow" p14:dur="2000"/>
     </mc:Choice>
-    <mc:Fallback>
+    <mc:Fallback xmlns="">
       <p:transition spd="slow"/>
     </mc:Fallback>
   </mc:AlternateContent>
@@ -11924,7 +13800,9 @@
         </p:nvSpPr>
         <p:spPr/>
         <p:txBody>
-          <a:bodyPr/>
+          <a:bodyPr>
+            <a:normAutofit/>
+          </a:bodyPr>
           <a:lstStyle/>
           <a:p>
             <a:r>
@@ -12003,10 +13881,6 @@
           <a:bodyPr/>
           <a:lstStyle/>
           <a:p>
-            <a:r>
-              <a:rPr lang="en-US" smtClean="0"/>
-              <a:t>/</a:t>
-            </a:r>
             <a:fld id="{DAAA4506-2605-4298-B94A-EC5D3A4D4A3F}" type="slidenum">
               <a:rPr lang="en-US" smtClean="0"/>
               <a:pPr/>
@@ -12026,11 +13900,11 @@
   <p:clrMapOvr>
     <a:masterClrMapping/>
   </p:clrMapOvr>
-  <mc:AlternateContent xmlns:mc="http://schemas.openxmlformats.org/markup-compatibility/2006">
-    <mc:Choice xmlns:p14="http://schemas.microsoft.com/office/powerpoint/2010/main" Requires="p14">
+  <mc:AlternateContent xmlns:mc="http://schemas.openxmlformats.org/markup-compatibility/2006" xmlns:p14="http://schemas.microsoft.com/office/powerpoint/2010/main">
+    <mc:Choice Requires="p14">
       <p:transition spd="slow" p14:dur="2000"/>
     </mc:Choice>
-    <mc:Fallback>
+    <mc:Fallback xmlns="">
       <p:transition spd="slow"/>
     </mc:Fallback>
   </mc:AlternateContent>
@@ -12483,7 +14357,7 @@
         <p:spPr/>
         <p:txBody>
           <a:bodyPr>
-            <a:normAutofit lnSpcReduction="10000"/>
+            <a:normAutofit/>
           </a:bodyPr>
           <a:lstStyle/>
           <a:p>
@@ -12583,10 +14457,6 @@
           <a:bodyPr/>
           <a:lstStyle/>
           <a:p>
-            <a:r>
-              <a:rPr lang="en-US" smtClean="0"/>
-              <a:t>/</a:t>
-            </a:r>
             <a:fld id="{DAAA4506-2605-4298-B94A-EC5D3A4D4A3F}" type="slidenum">
               <a:rPr lang="en-US" smtClean="0"/>
               <a:pPr/>
@@ -12606,11 +14476,11 @@
   <p:clrMapOvr>
     <a:masterClrMapping/>
   </p:clrMapOvr>
-  <mc:AlternateContent xmlns:mc="http://schemas.openxmlformats.org/markup-compatibility/2006">
-    <mc:Choice xmlns:p14="http://schemas.microsoft.com/office/powerpoint/2010/main" Requires="p14">
+  <mc:AlternateContent xmlns:mc="http://schemas.openxmlformats.org/markup-compatibility/2006" xmlns:p14="http://schemas.microsoft.com/office/powerpoint/2010/main">
+    <mc:Choice Requires="p14">
       <p:transition spd="slow" p14:dur="2000"/>
     </mc:Choice>
-    <mc:Fallback>
+    <mc:Fallback xmlns="">
       <p:transition spd="slow"/>
     </mc:Fallback>
   </mc:AlternateContent>
@@ -13166,7 +15036,7 @@
 <file path=ppt/theme/theme1.xml><?xml version="1.0" encoding="utf-8"?>
 <a:theme xmlns:a="http://schemas.openxmlformats.org/drawingml/2006/main" name="Office Theme">
   <a:themeElements>
-    <a:clrScheme name="Office Theme">
+    <a:clrScheme name="Office">
       <a:dk1>
         <a:sysClr val="windowText" lastClr="000000"/>
       </a:dk1>
@@ -13204,19 +15074,79 @@
         <a:srgbClr val="954F72"/>
       </a:folHlink>
     </a:clrScheme>
-    <a:fontScheme name="Book Antiqua">
+    <a:fontScheme name="Cambria-Calibri">
       <a:majorFont>
-        <a:latin typeface="Book Antiqua"/>
+        <a:latin typeface="Cambria" panose="02040503050406030204"/>
         <a:ea typeface=""/>
         <a:cs typeface=""/>
+        <a:font script="Jpan" typeface="ＭＳ Ｐゴシック"/>
+        <a:font script="Hang" typeface="맑은 고딕"/>
+        <a:font script="Hans" typeface="黑体"/>
+        <a:font script="Hant" typeface="新細明體"/>
+        <a:font script="Arab" typeface="Times New Roman"/>
+        <a:font script="Hebr" typeface="Times New Roman"/>
+        <a:font script="Thai" typeface="Angsana New"/>
+        <a:font script="Ethi" typeface="Nyala"/>
+        <a:font script="Beng" typeface="Vrinda"/>
+        <a:font script="Gujr" typeface="Shruti"/>
+        <a:font script="Khmr" typeface="MoolBoran"/>
+        <a:font script="Knda" typeface="Tunga"/>
+        <a:font script="Guru" typeface="Raavi"/>
+        <a:font script="Cans" typeface="Euphemia"/>
+        <a:font script="Cher" typeface="Plantagenet Cherokee"/>
+        <a:font script="Yiii" typeface="Microsoft Yi Baiti"/>
+        <a:font script="Tibt" typeface="Microsoft Himalaya"/>
+        <a:font script="Thaa" typeface="MV Boli"/>
+        <a:font script="Deva" typeface="Mangal"/>
+        <a:font script="Telu" typeface="Gautami"/>
+        <a:font script="Taml" typeface="Latha"/>
+        <a:font script="Syrc" typeface="Estrangelo Edessa"/>
+        <a:font script="Orya" typeface="Kalinga"/>
+        <a:font script="Mlym" typeface="Kartika"/>
+        <a:font script="Laoo" typeface="DokChampa"/>
+        <a:font script="Sinh" typeface="Iskoola Pota"/>
+        <a:font script="Mong" typeface="Mongolian Baiti"/>
+        <a:font script="Viet" typeface="Times New Roman"/>
+        <a:font script="Uigh" typeface="Microsoft Uighur"/>
+        <a:font script="Geor" typeface="Sylfaen"/>
       </a:majorFont>
       <a:minorFont>
-        <a:latin typeface="Book Antiqua"/>
+        <a:latin typeface="Calibri" panose="020F0502020204030204"/>
         <a:ea typeface=""/>
         <a:cs typeface=""/>
+        <a:font script="Jpan" typeface="ＭＳ Ｐゴシック"/>
+        <a:font script="Hang" typeface="맑은 고딕"/>
+        <a:font script="Hans" typeface="宋体"/>
+        <a:font script="Hant" typeface="新細明體"/>
+        <a:font script="Arab" typeface="Arial"/>
+        <a:font script="Hebr" typeface="Arial"/>
+        <a:font script="Thai" typeface="Cordia New"/>
+        <a:font script="Ethi" typeface="Nyala"/>
+        <a:font script="Beng" typeface="Vrinda"/>
+        <a:font script="Gujr" typeface="Shruti"/>
+        <a:font script="Khmr" typeface="DaunPenh"/>
+        <a:font script="Knda" typeface="Tunga"/>
+        <a:font script="Guru" typeface="Raavi"/>
+        <a:font script="Cans" typeface="Euphemia"/>
+        <a:font script="Cher" typeface="Plantagenet Cherokee"/>
+        <a:font script="Yiii" typeface="Microsoft Yi Baiti"/>
+        <a:font script="Tibt" typeface="Microsoft Himalaya"/>
+        <a:font script="Thaa" typeface="MV Boli"/>
+        <a:font script="Deva" typeface="Mangal"/>
+        <a:font script="Telu" typeface="Gautami"/>
+        <a:font script="Taml" typeface="Latha"/>
+        <a:font script="Syrc" typeface="Estrangelo Edessa"/>
+        <a:font script="Orya" typeface="Kalinga"/>
+        <a:font script="Mlym" typeface="Kartika"/>
+        <a:font script="Laoo" typeface="DokChampa"/>
+        <a:font script="Sinh" typeface="Iskoola Pota"/>
+        <a:font script="Mong" typeface="Mongolian Baiti"/>
+        <a:font script="Viet" typeface="Tahoma"/>
+        <a:font script="Uigh" typeface="Microsoft Uighur"/>
+        <a:font script="Geor" typeface="Sylfaen"/>
       </a:minorFont>
     </a:fontScheme>
-    <a:fmtScheme name="Office Theme">
+    <a:fmtScheme name="Office">
       <a:fillStyleLst>
         <a:solidFill>
           <a:schemeClr val="phClr"/>
@@ -13358,7 +15288,7 @@
   <a:extraClrSchemeLst/>
   <a:extLst>
     <a:ext uri="{05A4C25C-085E-4340-85A3-A5531E510DB2}">
-      <thm15:themeFamily xmlns:thm15="http://schemas.microsoft.com/office/thememl/2012/main" name="Office Theme" id="{62F939B6-93AF-4DB8-9C6B-D6C7DFDC589F}" vid="{4F46216B-77A9-411A-B9D3-5023FCB70208}"/>
+      <thm15:themeFamily xmlns:thm15="http://schemas.microsoft.com/office/thememl/2012/main" name="Office Theme" id="{62F939B6-93AF-4DB8-9C6B-D6C7DFDC589F}" vid="{4A3C46E8-61CC-4603-A589-7422A47A8E4A}"/>
     </a:ext>
   </a:extLst>
 </a:theme>

</xml_diff>